<commit_message>
Finalisation des documents de rendu
</commit_message>
<xml_diff>
--- a/Revue de projet/Revue de projet 2/Diapo revue de projet.pptx
+++ b/Revue de projet/Revue de projet 2/Diapo revue de projet.pptx
@@ -5,44 +5,45 @@
     <p:sldMasterId id="2147483659" r:id="rId4"/>
   </p:sldMasterIdLst>
   <p:notesMasterIdLst>
-    <p:notesMasterId r:id="rId15"/>
+    <p:notesMasterId r:id="rId16"/>
   </p:notesMasterIdLst>
   <p:handoutMasterIdLst>
-    <p:handoutMasterId r:id="rId16"/>
+    <p:handoutMasterId r:id="rId17"/>
   </p:handoutMasterIdLst>
   <p:sldIdLst>
     <p:sldId id="256" r:id="rId5"/>
     <p:sldId id="257" r:id="rId6"/>
     <p:sldId id="292" r:id="rId7"/>
     <p:sldId id="294" r:id="rId8"/>
-    <p:sldId id="316" r:id="rId9"/>
-    <p:sldId id="318" r:id="rId10"/>
-    <p:sldId id="332" r:id="rId11"/>
-    <p:sldId id="310" r:id="rId12"/>
-    <p:sldId id="308" r:id="rId13"/>
-    <p:sldId id="313" r:id="rId14"/>
+    <p:sldId id="333" r:id="rId9"/>
+    <p:sldId id="316" r:id="rId10"/>
+    <p:sldId id="318" r:id="rId11"/>
+    <p:sldId id="332" r:id="rId12"/>
+    <p:sldId id="310" r:id="rId13"/>
+    <p:sldId id="308" r:id="rId14"/>
+    <p:sldId id="313" r:id="rId15"/>
   </p:sldIdLst>
   <p:sldSz cx="9144000" cy="5143500" type="screen16x9"/>
   <p:notesSz cx="6858000" cy="9144000"/>
   <p:embeddedFontLst>
     <p:embeddedFont>
       <p:font typeface="Maven Pro" panose="020B0604020202020204" charset="0"/>
-      <p:regular r:id="rId17"/>
-      <p:bold r:id="rId18"/>
+      <p:regular r:id="rId18"/>
+      <p:bold r:id="rId19"/>
     </p:embeddedFont>
     <p:embeddedFont>
       <p:font typeface="Nunito Light" pitchFamily="2" charset="0"/>
-      <p:regular r:id="rId19"/>
-      <p:italic r:id="rId20"/>
+      <p:regular r:id="rId20"/>
+      <p:italic r:id="rId21"/>
     </p:embeddedFont>
     <p:embeddedFont>
       <p:font typeface="Roboto Condensed Light" panose="02000000000000000000" pitchFamily="2" charset="0"/>
-      <p:regular r:id="rId21"/>
-      <p:italic r:id="rId22"/>
+      <p:regular r:id="rId22"/>
+      <p:italic r:id="rId23"/>
     </p:embeddedFont>
     <p:embeddedFont>
       <p:font typeface="Share Tech" panose="020B0604020202020204" charset="0"/>
-      <p:regular r:id="rId23"/>
+      <p:regular r:id="rId24"/>
     </p:embeddedFont>
   </p:embeddedFontLst>
   <p:defaultTextStyle>
@@ -574,14 +575,7 @@
           </c:dLbls>
           <c:cat>
             <c:strRef>
-              <c:extLst>
-                <c:ext xmlns:c15="http://schemas.microsoft.com/office/drawing/2012/chart" uri="{02D57815-91ED-43cb-92C2-25804820EDAC}">
-                  <c15:fullRef>
-                    <c15:sqref>Feuil1!$A$2:$A$9</c15:sqref>
-                  </c15:fullRef>
-                </c:ext>
-              </c:extLst>
-              <c:f>Feuil1!$A$2:$A$8</c:f>
+              <c:f>Feuil1!$A$2:$A$9</c:f>
               <c:strCache>
                 <c:ptCount val="7"/>
                 <c:pt idx="0">
@@ -606,18 +600,12 @@
                   <c:v>Veille numérique</c:v>
                 </c:pt>
               </c:strCache>
+              <c:extLst/>
             </c:strRef>
           </c:cat>
           <c:val>
             <c:numRef>
-              <c:extLst>
-                <c:ext xmlns:c15="http://schemas.microsoft.com/office/drawing/2012/chart" uri="{02D57815-91ED-43cb-92C2-25804820EDAC}">
-                  <c15:fullRef>
-                    <c15:sqref>Feuil1!$B$2:$B$9</c15:sqref>
-                  </c15:fullRef>
-                </c:ext>
-              </c:extLst>
-              <c:f>Feuil1!$B$2:$B$8</c:f>
+              <c:f>Feuil1!$B$2:$B$9</c:f>
               <c:numCache>
                 <c:formatCode>General</c:formatCode>
                 <c:ptCount val="7"/>
@@ -643,30 +631,10 @@
                   <c:v>2</c:v>
                 </c:pt>
               </c:numCache>
+              <c:extLst/>
             </c:numRef>
           </c:val>
           <c:extLst>
-            <c:ext xmlns:c15="http://schemas.microsoft.com/office/drawing/2012/chart" uri="{02D57815-91ED-43cb-92C2-25804820EDAC}">
-              <c15:categoryFilterExceptions>
-                <c15:categoryFilterException>
-                  <c15:sqref>Feuil1!$B$9</c15:sqref>
-                  <c15:spPr xmlns:c15="http://schemas.microsoft.com/office/drawing/2012/chart">
-                    <a:solidFill>
-                      <a:schemeClr val="accent2">
-                        <a:lumMod val="60000"/>
-                      </a:schemeClr>
-                    </a:solidFill>
-                    <a:ln w="19050">
-                      <a:solidFill>
-                        <a:schemeClr val="lt1"/>
-                      </a:solidFill>
-                    </a:ln>
-                    <a:effectLst/>
-                  </c15:spPr>
-                  <c15:bubble3D val="0"/>
-                </c15:categoryFilterException>
-              </c15:categoryFilterExceptions>
-            </c:ext>
             <c:ext xmlns:c16="http://schemas.microsoft.com/office/drawing/2014/chart" uri="{C3380CC4-5D6E-409C-BE32-E72D297353CC}">
               <c16:uniqueId val="{00000000-9BC0-4A2A-B420-A87C4526A351}"/>
             </c:ext>
@@ -1420,7 +1388,7 @@
           <a:p>
             <a:fld id="{1177AD86-A677-4E33-B4C2-8C9F15FBF2CD}" type="datetimeFigureOut">
               <a:rPr lang="fr-FR" smtClean="0"/>
-              <a:t>07/04/2024</a:t>
+              <a:t>08/04/2024</a:t>
             </a:fld>
             <a:endParaRPr lang="fr-FR"/>
           </a:p>
@@ -13577,8 +13545,8 @@
         </p:nvSpPr>
         <p:spPr>
           <a:xfrm>
-            <a:off x="471463" y="313509"/>
-            <a:ext cx="4825229" cy="3197164"/>
+            <a:off x="492847" y="827952"/>
+            <a:ext cx="4825229" cy="2519664"/>
           </a:xfrm>
           <a:prstGeom prst="rect">
             <a:avLst/>
@@ -13605,7 +13573,7 @@
                   <a:srgbClr val="00CFCC"/>
                 </a:solidFill>
               </a:rPr>
-              <a:t>Revue intérmédiaire</a:t>
+              <a:t>Revue finale</a:t>
             </a:r>
             <a:br>
               <a:rPr lang="en" dirty="0">
@@ -13632,7 +13600,7 @@
                   <a:srgbClr val="00CFCC"/>
                 </a:solidFill>
               </a:rPr>
-              <a:t>S5.A.01</a:t>
+              <a:t>S6.A.01</a:t>
             </a:r>
             <a:endParaRPr dirty="0"/>
           </a:p>
@@ -15091,6 +15059,1708 @@
   <p:cSld>
     <p:spTree>
       <p:nvGrpSpPr>
+        <p:cNvPr id="1" name="Shape 465"/>
+        <p:cNvGrpSpPr/>
+        <p:nvPr/>
+      </p:nvGrpSpPr>
+      <p:grpSpPr>
+        <a:xfrm>
+          <a:off x="0" y="0"/>
+          <a:ext cx="0" cy="0"/>
+          <a:chOff x="0" y="0"/>
+          <a:chExt cx="0" cy="0"/>
+        </a:xfrm>
+      </p:grpSpPr>
+      <p:sp>
+        <p:nvSpPr>
+          <p:cNvPr id="466" name="Google Shape;466;p23"/>
+          <p:cNvSpPr txBox="1">
+            <a:spLocks noGrp="1"/>
+          </p:cNvSpPr>
+          <p:nvPr>
+            <p:ph type="title"/>
+          </p:nvPr>
+        </p:nvSpPr>
+        <p:spPr>
+          <a:xfrm>
+            <a:off x="720000" y="539500"/>
+            <a:ext cx="7704000" cy="572700"/>
+          </a:xfrm>
+          <a:prstGeom prst="rect">
+            <a:avLst/>
+          </a:prstGeom>
+        </p:spPr>
+        <p:txBody>
+          <a:bodyPr spcFirstLastPara="1" wrap="square" lIns="91425" tIns="91425" rIns="91425" bIns="91425" anchor="t" anchorCtr="0">
+            <a:noAutofit/>
+          </a:bodyPr>
+          <a:lstStyle/>
+          <a:p>
+            <a:pPr marL="0" lvl="0" indent="0" algn="l" rtl="0">
+              <a:spcBef>
+                <a:spcPts val="0"/>
+              </a:spcBef>
+              <a:spcAft>
+                <a:spcPts val="0"/>
+              </a:spcAft>
+              <a:buNone/>
+            </a:pPr>
+            <a:r>
+              <a:rPr lang="fr-FR" dirty="0"/>
+              <a:t>Démonstration technique</a:t>
+            </a:r>
+            <a:endParaRPr dirty="0"/>
+          </a:p>
+        </p:txBody>
+      </p:sp>
+      <p:sp>
+        <p:nvSpPr>
+          <p:cNvPr id="469" name="Google Shape;469;p23"/>
+          <p:cNvSpPr/>
+          <p:nvPr/>
+        </p:nvSpPr>
+        <p:spPr>
+          <a:xfrm>
+            <a:off x="1183633" y="2803400"/>
+            <a:ext cx="1466700" cy="1800600"/>
+          </a:xfrm>
+          <a:prstGeom prst="rect">
+            <a:avLst/>
+          </a:prstGeom>
+          <a:noFill/>
+          <a:ln w="19050" cap="flat" cmpd="sng">
+            <a:solidFill>
+              <a:schemeClr val="lt2"/>
+            </a:solidFill>
+            <a:prstDash val="solid"/>
+            <a:round/>
+            <a:headEnd type="none" w="sm" len="sm"/>
+            <a:tailEnd type="none" w="sm" len="sm"/>
+          </a:ln>
+        </p:spPr>
+        <p:txBody>
+          <a:bodyPr spcFirstLastPara="1" wrap="square" lIns="91425" tIns="91425" rIns="91425" bIns="91425" anchor="ctr" anchorCtr="0">
+            <a:noAutofit/>
+          </a:bodyPr>
+          <a:lstStyle/>
+          <a:p>
+            <a:pPr marL="0" lvl="0" indent="0" algn="l" rtl="0">
+              <a:spcBef>
+                <a:spcPts val="0"/>
+              </a:spcBef>
+              <a:spcAft>
+                <a:spcPts val="0"/>
+              </a:spcAft>
+              <a:buNone/>
+            </a:pPr>
+            <a:endParaRPr/>
+          </a:p>
+        </p:txBody>
+      </p:sp>
+      <p:sp>
+        <p:nvSpPr>
+          <p:cNvPr id="470" name="Google Shape;470;p23"/>
+          <p:cNvSpPr/>
+          <p:nvPr/>
+        </p:nvSpPr>
+        <p:spPr>
+          <a:xfrm>
+            <a:off x="1498074" y="2182159"/>
+            <a:ext cx="833100" cy="833100"/>
+          </a:xfrm>
+          <a:prstGeom prst="rect">
+            <a:avLst/>
+          </a:prstGeom>
+          <a:solidFill>
+            <a:schemeClr val="accent5"/>
+          </a:solidFill>
+          <a:ln>
+            <a:noFill/>
+          </a:ln>
+        </p:spPr>
+        <p:txBody>
+          <a:bodyPr spcFirstLastPara="1" wrap="square" lIns="91425" tIns="91425" rIns="91425" bIns="91425" anchor="ctr" anchorCtr="0">
+            <a:noAutofit/>
+          </a:bodyPr>
+          <a:lstStyle/>
+          <a:p>
+            <a:pPr marL="0" lvl="0" indent="0" algn="l" rtl="0">
+              <a:spcBef>
+                <a:spcPts val="0"/>
+              </a:spcBef>
+              <a:spcAft>
+                <a:spcPts val="0"/>
+              </a:spcAft>
+              <a:buNone/>
+            </a:pPr>
+            <a:endParaRPr/>
+          </a:p>
+        </p:txBody>
+      </p:sp>
+      <p:sp>
+        <p:nvSpPr>
+          <p:cNvPr id="471" name="Google Shape;471;p23"/>
+          <p:cNvSpPr/>
+          <p:nvPr/>
+        </p:nvSpPr>
+        <p:spPr>
+          <a:xfrm>
+            <a:off x="3099148" y="2803400"/>
+            <a:ext cx="1466700" cy="1800600"/>
+          </a:xfrm>
+          <a:prstGeom prst="rect">
+            <a:avLst/>
+          </a:prstGeom>
+          <a:noFill/>
+          <a:ln w="19050" cap="flat" cmpd="sng">
+            <a:solidFill>
+              <a:schemeClr val="lt2"/>
+            </a:solidFill>
+            <a:prstDash val="solid"/>
+            <a:round/>
+            <a:headEnd type="none" w="sm" len="sm"/>
+            <a:tailEnd type="none" w="sm" len="sm"/>
+          </a:ln>
+        </p:spPr>
+        <p:txBody>
+          <a:bodyPr spcFirstLastPara="1" wrap="square" lIns="91425" tIns="91425" rIns="91425" bIns="91425" anchor="ctr" anchorCtr="0">
+            <a:noAutofit/>
+          </a:bodyPr>
+          <a:lstStyle/>
+          <a:p>
+            <a:pPr marL="0" lvl="0" indent="0" algn="l" rtl="0">
+              <a:spcBef>
+                <a:spcPts val="0"/>
+              </a:spcBef>
+              <a:spcAft>
+                <a:spcPts val="0"/>
+              </a:spcAft>
+              <a:buNone/>
+            </a:pPr>
+            <a:endParaRPr/>
+          </a:p>
+        </p:txBody>
+      </p:sp>
+      <p:sp>
+        <p:nvSpPr>
+          <p:cNvPr id="472" name="Google Shape;472;p23"/>
+          <p:cNvSpPr/>
+          <p:nvPr/>
+        </p:nvSpPr>
+        <p:spPr>
+          <a:xfrm>
+            <a:off x="3415223" y="2147250"/>
+            <a:ext cx="833100" cy="833100"/>
+          </a:xfrm>
+          <a:prstGeom prst="rect">
+            <a:avLst/>
+          </a:prstGeom>
+          <a:solidFill>
+            <a:schemeClr val="accent1"/>
+          </a:solidFill>
+          <a:ln>
+            <a:noFill/>
+          </a:ln>
+        </p:spPr>
+        <p:txBody>
+          <a:bodyPr spcFirstLastPara="1" wrap="square" lIns="91425" tIns="91425" rIns="91425" bIns="91425" anchor="ctr" anchorCtr="0">
+            <a:noAutofit/>
+          </a:bodyPr>
+          <a:lstStyle/>
+          <a:p>
+            <a:pPr marL="0" lvl="0" indent="0" algn="l" rtl="0">
+              <a:spcBef>
+                <a:spcPts val="0"/>
+              </a:spcBef>
+              <a:spcAft>
+                <a:spcPts val="0"/>
+              </a:spcAft>
+              <a:buNone/>
+            </a:pPr>
+            <a:endParaRPr/>
+          </a:p>
+        </p:txBody>
+      </p:sp>
+      <p:grpSp>
+        <p:nvGrpSpPr>
+          <p:cNvPr id="497" name="Google Shape;497;p23"/>
+          <p:cNvGrpSpPr/>
+          <p:nvPr/>
+        </p:nvGrpSpPr>
+        <p:grpSpPr>
+          <a:xfrm>
+            <a:off x="1183644" y="1453300"/>
+            <a:ext cx="1466707" cy="2689409"/>
+            <a:chOff x="3838663" y="1458000"/>
+            <a:chExt cx="1466707" cy="2689409"/>
+          </a:xfrm>
+        </p:grpSpPr>
+        <p:grpSp>
+          <p:nvGrpSpPr>
+            <p:cNvPr id="498" name="Google Shape;498;p23"/>
+            <p:cNvGrpSpPr/>
+            <p:nvPr/>
+          </p:nvGrpSpPr>
+          <p:grpSpPr>
+            <a:xfrm>
+              <a:off x="3838663" y="3163974"/>
+              <a:ext cx="1466707" cy="983435"/>
+              <a:chOff x="3012024" y="3299387"/>
+              <a:chExt cx="1466707" cy="983435"/>
+            </a:xfrm>
+          </p:grpSpPr>
+          <p:sp>
+            <p:nvSpPr>
+              <p:cNvPr id="499" name="Google Shape;499;p23"/>
+              <p:cNvSpPr txBox="1"/>
+              <p:nvPr/>
+            </p:nvSpPr>
+            <p:spPr>
+              <a:xfrm>
+                <a:off x="3012031" y="3299387"/>
+                <a:ext cx="1466700" cy="457200"/>
+              </a:xfrm>
+              <a:prstGeom prst="rect">
+                <a:avLst/>
+              </a:prstGeom>
+              <a:noFill/>
+              <a:ln>
+                <a:noFill/>
+              </a:ln>
+            </p:spPr>
+            <p:txBody>
+              <a:bodyPr spcFirstLastPara="1" wrap="square" lIns="91425" tIns="91425" rIns="91425" bIns="91425" anchor="b" anchorCtr="0">
+                <a:noAutofit/>
+              </a:bodyPr>
+              <a:lstStyle/>
+              <a:p>
+                <a:pPr marL="0" lvl="0" indent="0" algn="ctr" rtl="0">
+                  <a:spcBef>
+                    <a:spcPts val="0"/>
+                  </a:spcBef>
+                  <a:spcAft>
+                    <a:spcPts val="0"/>
+                  </a:spcAft>
+                  <a:buNone/>
+                </a:pPr>
+                <a:r>
+                  <a:rPr lang="en" sz="2000" dirty="0">
+                    <a:solidFill>
+                      <a:schemeClr val="accent2">
+                        <a:lumMod val="60000"/>
+                        <a:lumOff val="40000"/>
+                      </a:schemeClr>
+                    </a:solidFill>
+                    <a:latin typeface="Share Tech"/>
+                    <a:ea typeface="Share Tech"/>
+                    <a:cs typeface="Share Tech"/>
+                    <a:sym typeface="Share Tech"/>
+                  </a:rPr>
+                  <a:t>Visualiser</a:t>
+                </a:r>
+                <a:endParaRPr sz="2000" dirty="0">
+                  <a:solidFill>
+                    <a:schemeClr val="accent2">
+                      <a:lumMod val="60000"/>
+                      <a:lumOff val="40000"/>
+                    </a:schemeClr>
+                  </a:solidFill>
+                  <a:latin typeface="Share Tech"/>
+                  <a:ea typeface="Share Tech"/>
+                  <a:cs typeface="Share Tech"/>
+                  <a:sym typeface="Share Tech"/>
+                </a:endParaRPr>
+              </a:p>
+            </p:txBody>
+          </p:sp>
+          <p:sp>
+            <p:nvSpPr>
+              <p:cNvPr id="500" name="Google Shape;500;p23"/>
+              <p:cNvSpPr txBox="1"/>
+              <p:nvPr/>
+            </p:nvSpPr>
+            <p:spPr>
+              <a:xfrm>
+                <a:off x="3012024" y="3601822"/>
+                <a:ext cx="1466700" cy="681000"/>
+              </a:xfrm>
+              <a:prstGeom prst="rect">
+                <a:avLst/>
+              </a:prstGeom>
+              <a:noFill/>
+              <a:ln>
+                <a:noFill/>
+              </a:ln>
+            </p:spPr>
+            <p:txBody>
+              <a:bodyPr spcFirstLastPara="1" wrap="square" lIns="91425" tIns="91425" rIns="91425" bIns="91425" anchor="t" anchorCtr="0">
+                <a:noAutofit/>
+              </a:bodyPr>
+              <a:lstStyle/>
+              <a:p>
+                <a:pPr marL="0" lvl="0" indent="0" algn="ctr" rtl="0">
+                  <a:spcBef>
+                    <a:spcPts val="0"/>
+                  </a:spcBef>
+                  <a:spcAft>
+                    <a:spcPts val="0"/>
+                  </a:spcAft>
+                  <a:buNone/>
+                </a:pPr>
+                <a:r>
+                  <a:rPr lang="fr-FR" sz="1300" dirty="0">
+                    <a:solidFill>
+                      <a:schemeClr val="dk1"/>
+                    </a:solidFill>
+                    <a:latin typeface="Maven Pro"/>
+                    <a:ea typeface="Maven Pro"/>
+                    <a:cs typeface="Maven Pro"/>
+                    <a:sym typeface="Maven Pro"/>
+                  </a:rPr>
+                  <a:t>l’application et ses fonctionnalités</a:t>
+                </a:r>
+                <a:endParaRPr sz="1300" dirty="0">
+                  <a:solidFill>
+                    <a:schemeClr val="dk1"/>
+                  </a:solidFill>
+                  <a:latin typeface="Maven Pro"/>
+                  <a:ea typeface="Maven Pro"/>
+                  <a:cs typeface="Maven Pro"/>
+                  <a:sym typeface="Maven Pro"/>
+                </a:endParaRPr>
+              </a:p>
+            </p:txBody>
+          </p:sp>
+        </p:grpSp>
+        <p:sp>
+          <p:nvSpPr>
+            <p:cNvPr id="501" name="Google Shape;501;p23"/>
+            <p:cNvSpPr txBox="1"/>
+            <p:nvPr/>
+          </p:nvSpPr>
+          <p:spPr>
+            <a:xfrm>
+              <a:off x="4187717" y="1458000"/>
+              <a:ext cx="768600" cy="457200"/>
+            </a:xfrm>
+            <a:prstGeom prst="rect">
+              <a:avLst/>
+            </a:prstGeom>
+            <a:noFill/>
+            <a:ln>
+              <a:noFill/>
+            </a:ln>
+          </p:spPr>
+          <p:txBody>
+            <a:bodyPr spcFirstLastPara="1" wrap="square" lIns="91425" tIns="91425" rIns="91425" bIns="91425" anchor="ctr" anchorCtr="0">
+              <a:noAutofit/>
+            </a:bodyPr>
+            <a:lstStyle/>
+            <a:p>
+              <a:pPr marL="0" lvl="0" indent="0" algn="ctr" rtl="0">
+                <a:spcBef>
+                  <a:spcPts val="0"/>
+                </a:spcBef>
+                <a:spcAft>
+                  <a:spcPts val="0"/>
+                </a:spcAft>
+                <a:buNone/>
+              </a:pPr>
+              <a:r>
+                <a:rPr lang="en" sz="2400" dirty="0">
+                  <a:solidFill>
+                    <a:schemeClr val="accent5"/>
+                  </a:solidFill>
+                  <a:latin typeface="Share Tech"/>
+                  <a:ea typeface="Share Tech"/>
+                  <a:cs typeface="Share Tech"/>
+                  <a:sym typeface="Share Tech"/>
+                </a:rPr>
+                <a:t>01</a:t>
+              </a:r>
+              <a:endParaRPr sz="2400" dirty="0">
+                <a:solidFill>
+                  <a:schemeClr val="accent5"/>
+                </a:solidFill>
+                <a:latin typeface="Share Tech"/>
+                <a:ea typeface="Share Tech"/>
+                <a:cs typeface="Share Tech"/>
+                <a:sym typeface="Share Tech"/>
+              </a:endParaRPr>
+            </a:p>
+          </p:txBody>
+        </p:sp>
+      </p:grpSp>
+      <p:grpSp>
+        <p:nvGrpSpPr>
+          <p:cNvPr id="502" name="Google Shape;502;p23"/>
+          <p:cNvGrpSpPr/>
+          <p:nvPr/>
+        </p:nvGrpSpPr>
+        <p:grpSpPr>
+          <a:xfrm>
+            <a:off x="3099146" y="1453300"/>
+            <a:ext cx="1466704" cy="2691920"/>
+            <a:chOff x="6107722" y="1458000"/>
+            <a:chExt cx="1466704" cy="2691920"/>
+          </a:xfrm>
+        </p:grpSpPr>
+        <p:grpSp>
+          <p:nvGrpSpPr>
+            <p:cNvPr id="503" name="Google Shape;503;p23"/>
+            <p:cNvGrpSpPr/>
+            <p:nvPr/>
+          </p:nvGrpSpPr>
+          <p:grpSpPr>
+            <a:xfrm>
+              <a:off x="6107722" y="3166485"/>
+              <a:ext cx="1466704" cy="983435"/>
+              <a:chOff x="6318523" y="3299387"/>
+              <a:chExt cx="1466704" cy="983435"/>
+            </a:xfrm>
+          </p:grpSpPr>
+          <p:sp>
+            <p:nvSpPr>
+              <p:cNvPr id="504" name="Google Shape;504;p23"/>
+              <p:cNvSpPr txBox="1"/>
+              <p:nvPr/>
+            </p:nvSpPr>
+            <p:spPr>
+              <a:xfrm>
+                <a:off x="6318526" y="3299387"/>
+                <a:ext cx="1466700" cy="457200"/>
+              </a:xfrm>
+              <a:prstGeom prst="rect">
+                <a:avLst/>
+              </a:prstGeom>
+              <a:noFill/>
+              <a:ln>
+                <a:noFill/>
+              </a:ln>
+            </p:spPr>
+            <p:txBody>
+              <a:bodyPr spcFirstLastPara="1" wrap="square" lIns="91425" tIns="91425" rIns="91425" bIns="91425" anchor="b" anchorCtr="0">
+                <a:noAutofit/>
+              </a:bodyPr>
+              <a:lstStyle/>
+              <a:p>
+                <a:pPr marL="0" lvl="0" indent="0" algn="ctr" rtl="0">
+                  <a:spcBef>
+                    <a:spcPts val="0"/>
+                  </a:spcBef>
+                  <a:spcAft>
+                    <a:spcPts val="0"/>
+                  </a:spcAft>
+                  <a:buNone/>
+                </a:pPr>
+                <a:r>
+                  <a:rPr lang="fr-FR" sz="2000" dirty="0">
+                    <a:solidFill>
+                      <a:schemeClr val="accent4">
+                        <a:lumMod val="60000"/>
+                        <a:lumOff val="40000"/>
+                      </a:schemeClr>
+                    </a:solidFill>
+                    <a:latin typeface="Share Tech"/>
+                    <a:ea typeface="Share Tech"/>
+                    <a:cs typeface="Share Tech"/>
+                    <a:sym typeface="Share Tech"/>
+                  </a:rPr>
+                  <a:t>Amélioration</a:t>
+                </a:r>
+                <a:endParaRPr sz="2000" dirty="0">
+                  <a:solidFill>
+                    <a:schemeClr val="accent4">
+                      <a:lumMod val="60000"/>
+                      <a:lumOff val="40000"/>
+                    </a:schemeClr>
+                  </a:solidFill>
+                  <a:latin typeface="Share Tech"/>
+                  <a:ea typeface="Share Tech"/>
+                  <a:cs typeface="Share Tech"/>
+                  <a:sym typeface="Share Tech"/>
+                </a:endParaRPr>
+              </a:p>
+            </p:txBody>
+          </p:sp>
+          <p:sp>
+            <p:nvSpPr>
+              <p:cNvPr id="505" name="Google Shape;505;p23"/>
+              <p:cNvSpPr txBox="1"/>
+              <p:nvPr/>
+            </p:nvSpPr>
+            <p:spPr>
+              <a:xfrm>
+                <a:off x="6318523" y="3601822"/>
+                <a:ext cx="1466700" cy="681000"/>
+              </a:xfrm>
+              <a:prstGeom prst="rect">
+                <a:avLst/>
+              </a:prstGeom>
+              <a:noFill/>
+              <a:ln>
+                <a:noFill/>
+              </a:ln>
+            </p:spPr>
+            <p:txBody>
+              <a:bodyPr spcFirstLastPara="1" wrap="square" lIns="91425" tIns="91425" rIns="91425" bIns="91425" anchor="t" anchorCtr="0">
+                <a:noAutofit/>
+              </a:bodyPr>
+              <a:lstStyle/>
+              <a:p>
+                <a:pPr marL="0" lvl="0" indent="0" algn="ctr" rtl="0">
+                  <a:spcBef>
+                    <a:spcPts val="0"/>
+                  </a:spcBef>
+                  <a:spcAft>
+                    <a:spcPts val="0"/>
+                  </a:spcAft>
+                  <a:buNone/>
+                </a:pPr>
+                <a:r>
+                  <a:rPr lang="fr-FR" sz="1300" dirty="0">
+                    <a:solidFill>
+                      <a:schemeClr val="dk1"/>
+                    </a:solidFill>
+                    <a:latin typeface="Maven Pro"/>
+                    <a:ea typeface="Maven Pro"/>
+                    <a:cs typeface="Maven Pro"/>
+                    <a:sym typeface="Maven Pro"/>
+                  </a:rPr>
+                  <a:t>apportée à l’application durant le semestre 6</a:t>
+                </a:r>
+                <a:endParaRPr sz="1300" dirty="0">
+                  <a:solidFill>
+                    <a:schemeClr val="dk1"/>
+                  </a:solidFill>
+                  <a:latin typeface="Maven Pro"/>
+                  <a:ea typeface="Maven Pro"/>
+                  <a:cs typeface="Maven Pro"/>
+                  <a:sym typeface="Maven Pro"/>
+                </a:endParaRPr>
+              </a:p>
+            </p:txBody>
+          </p:sp>
+        </p:grpSp>
+        <p:sp>
+          <p:nvSpPr>
+            <p:cNvPr id="506" name="Google Shape;506;p23"/>
+            <p:cNvSpPr txBox="1"/>
+            <p:nvPr/>
+          </p:nvSpPr>
+          <p:spPr>
+            <a:xfrm>
+              <a:off x="6456774" y="1458000"/>
+              <a:ext cx="768600" cy="457200"/>
+            </a:xfrm>
+            <a:prstGeom prst="rect">
+              <a:avLst/>
+            </a:prstGeom>
+            <a:noFill/>
+            <a:ln>
+              <a:noFill/>
+            </a:ln>
+          </p:spPr>
+          <p:txBody>
+            <a:bodyPr spcFirstLastPara="1" wrap="square" lIns="91425" tIns="91425" rIns="91425" bIns="91425" anchor="ctr" anchorCtr="0">
+              <a:noAutofit/>
+            </a:bodyPr>
+            <a:lstStyle/>
+            <a:p>
+              <a:pPr marL="0" lvl="0" indent="0" algn="ctr" rtl="0">
+                <a:spcBef>
+                  <a:spcPts val="0"/>
+                </a:spcBef>
+                <a:spcAft>
+                  <a:spcPts val="0"/>
+                </a:spcAft>
+                <a:buNone/>
+              </a:pPr>
+              <a:r>
+                <a:rPr lang="en" sz="2400" dirty="0">
+                  <a:solidFill>
+                    <a:schemeClr val="accent1"/>
+                  </a:solidFill>
+                  <a:latin typeface="Share Tech"/>
+                  <a:ea typeface="Share Tech"/>
+                  <a:cs typeface="Share Tech"/>
+                  <a:sym typeface="Share Tech"/>
+                </a:rPr>
+                <a:t>02</a:t>
+              </a:r>
+              <a:endParaRPr sz="2400" dirty="0">
+                <a:solidFill>
+                  <a:schemeClr val="accent1"/>
+                </a:solidFill>
+                <a:latin typeface="Share Tech"/>
+                <a:ea typeface="Share Tech"/>
+                <a:cs typeface="Share Tech"/>
+                <a:sym typeface="Share Tech"/>
+              </a:endParaRPr>
+            </a:p>
+          </p:txBody>
+        </p:sp>
+      </p:grpSp>
+      <p:cxnSp>
+        <p:nvCxnSpPr>
+          <p:cNvPr id="508" name="Google Shape;508;p23"/>
+          <p:cNvCxnSpPr>
+            <a:cxnSpLocks/>
+            <a:stCxn id="501" idx="3"/>
+            <a:endCxn id="506" idx="1"/>
+          </p:cNvCxnSpPr>
+          <p:nvPr/>
+        </p:nvCxnSpPr>
+        <p:spPr>
+          <a:xfrm>
+            <a:off x="2301298" y="1681900"/>
+            <a:ext cx="1146900" cy="0"/>
+          </a:xfrm>
+          <a:prstGeom prst="straightConnector1">
+            <a:avLst/>
+          </a:prstGeom>
+          <a:noFill/>
+          <a:ln w="19050" cap="flat" cmpd="sng">
+            <a:solidFill>
+              <a:schemeClr val="lt2"/>
+            </a:solidFill>
+            <a:prstDash val="dash"/>
+            <a:round/>
+            <a:headEnd type="none" w="med" len="med"/>
+            <a:tailEnd type="none" w="med" len="med"/>
+          </a:ln>
+        </p:spPr>
+      </p:cxnSp>
+      <p:cxnSp>
+        <p:nvCxnSpPr>
+          <p:cNvPr id="510" name="Google Shape;510;p23"/>
+          <p:cNvCxnSpPr>
+            <a:cxnSpLocks/>
+            <a:stCxn id="501" idx="2"/>
+            <a:endCxn id="470" idx="0"/>
+          </p:cNvCxnSpPr>
+          <p:nvPr/>
+        </p:nvCxnSpPr>
+        <p:spPr>
+          <a:xfrm flipH="1">
+            <a:off x="1914624" y="1910500"/>
+            <a:ext cx="2374" cy="271659"/>
+          </a:xfrm>
+          <a:prstGeom prst="straightConnector1">
+            <a:avLst/>
+          </a:prstGeom>
+          <a:noFill/>
+          <a:ln w="19050" cap="flat" cmpd="sng">
+            <a:solidFill>
+              <a:schemeClr val="lt2"/>
+            </a:solidFill>
+            <a:prstDash val="solid"/>
+            <a:round/>
+            <a:headEnd type="none" w="med" len="med"/>
+            <a:tailEnd type="oval" w="med" len="med"/>
+          </a:ln>
+        </p:spPr>
+      </p:cxnSp>
+      <p:cxnSp>
+        <p:nvCxnSpPr>
+          <p:cNvPr id="511" name="Google Shape;511;p23"/>
+          <p:cNvCxnSpPr>
+            <a:cxnSpLocks/>
+            <a:stCxn id="506" idx="2"/>
+            <a:endCxn id="472" idx="0"/>
+          </p:cNvCxnSpPr>
+          <p:nvPr/>
+        </p:nvCxnSpPr>
+        <p:spPr>
+          <a:xfrm flipH="1">
+            <a:off x="3831773" y="1910500"/>
+            <a:ext cx="725" cy="236750"/>
+          </a:xfrm>
+          <a:prstGeom prst="straightConnector1">
+            <a:avLst/>
+          </a:prstGeom>
+          <a:noFill/>
+          <a:ln w="19050" cap="flat" cmpd="sng">
+            <a:solidFill>
+              <a:schemeClr val="lt2"/>
+            </a:solidFill>
+            <a:prstDash val="solid"/>
+            <a:round/>
+            <a:headEnd type="none" w="med" len="med"/>
+            <a:tailEnd type="oval" w="med" len="med"/>
+          </a:ln>
+        </p:spPr>
+      </p:cxnSp>
+      <p:sp>
+        <p:nvSpPr>
+          <p:cNvPr id="2" name="ZoneTexte 1">
+            <a:extLst>
+              <a:ext uri="{FF2B5EF4-FFF2-40B4-BE49-F238E27FC236}">
+                <a16:creationId xmlns:a16="http://schemas.microsoft.com/office/drawing/2014/main" id="{A8EA55CD-2847-E81C-7BED-E27AF3C38BD7}"/>
+              </a:ext>
+            </a:extLst>
+          </p:cNvPr>
+          <p:cNvSpPr txBox="1"/>
+          <p:nvPr/>
+        </p:nvSpPr>
+        <p:spPr>
+          <a:xfrm>
+            <a:off x="8781856" y="4806393"/>
+            <a:ext cx="362144" cy="261610"/>
+          </a:xfrm>
+          <a:prstGeom prst="rect">
+            <a:avLst/>
+          </a:prstGeom>
+          <a:noFill/>
+        </p:spPr>
+        <p:txBody>
+          <a:bodyPr wrap="square" rtlCol="0">
+            <a:spAutoFit/>
+          </a:bodyPr>
+          <a:lstStyle/>
+          <a:p>
+            <a:r>
+              <a:rPr lang="fr-FR" sz="1100" dirty="0">
+                <a:solidFill>
+                  <a:schemeClr val="tx1"/>
+                </a:solidFill>
+                <a:latin typeface="Maven Pro" panose="020B0604020202020204" charset="0"/>
+              </a:rPr>
+              <a:t>10</a:t>
+            </a:r>
+          </a:p>
+        </p:txBody>
+      </p:sp>
+      <p:pic>
+        <p:nvPicPr>
+          <p:cNvPr id="17" name="Graphique 16" descr="Carte topographique contour">
+            <a:extLst>
+              <a:ext uri="{FF2B5EF4-FFF2-40B4-BE49-F238E27FC236}">
+                <a16:creationId xmlns:a16="http://schemas.microsoft.com/office/drawing/2014/main" id="{3908EBA0-2CBD-FA32-A930-76DD5E6BBBAF}"/>
+              </a:ext>
+            </a:extLst>
+          </p:cNvPr>
+          <p:cNvPicPr>
+            <a:picLocks noChangeAspect="1"/>
+          </p:cNvPicPr>
+          <p:nvPr/>
+        </p:nvPicPr>
+        <p:blipFill>
+          <a:blip r:embed="rId3">
+            <a:extLst>
+              <a:ext uri="{96DAC541-7B7A-43D3-8B79-37D633B846F1}">
+                <asvg:svgBlip xmlns:asvg="http://schemas.microsoft.com/office/drawing/2016/SVG/main" r:embed="rId4"/>
+              </a:ext>
+            </a:extLst>
+          </a:blip>
+          <a:stretch>
+            <a:fillRect/>
+          </a:stretch>
+        </p:blipFill>
+        <p:spPr>
+          <a:xfrm>
+            <a:off x="1582804" y="2239237"/>
+            <a:ext cx="663640" cy="663640"/>
+          </a:xfrm>
+          <a:prstGeom prst="rect">
+            <a:avLst/>
+          </a:prstGeom>
+        </p:spPr>
+      </p:pic>
+      <p:pic>
+        <p:nvPicPr>
+          <p:cNvPr id="22" name="Graphique 21" descr="Plan contour">
+            <a:extLst>
+              <a:ext uri="{FF2B5EF4-FFF2-40B4-BE49-F238E27FC236}">
+                <a16:creationId xmlns:a16="http://schemas.microsoft.com/office/drawing/2014/main" id="{442C319D-5CA1-DDE6-CABA-6B42ECE25E52}"/>
+              </a:ext>
+            </a:extLst>
+          </p:cNvPr>
+          <p:cNvPicPr>
+            <a:picLocks noChangeAspect="1"/>
+          </p:cNvPicPr>
+          <p:nvPr/>
+        </p:nvPicPr>
+        <p:blipFill>
+          <a:blip r:embed="rId5">
+            <a:extLst>
+              <a:ext uri="{96DAC541-7B7A-43D3-8B79-37D633B846F1}">
+                <asvg:svgBlip xmlns:asvg="http://schemas.microsoft.com/office/drawing/2016/SVG/main" r:embed="rId6"/>
+              </a:ext>
+            </a:extLst>
+          </a:blip>
+          <a:stretch>
+            <a:fillRect/>
+          </a:stretch>
+        </p:blipFill>
+        <p:spPr>
+          <a:xfrm>
+            <a:off x="3448198" y="2199254"/>
+            <a:ext cx="742201" cy="742201"/>
+          </a:xfrm>
+          <a:prstGeom prst="rect">
+            <a:avLst/>
+          </a:prstGeom>
+        </p:spPr>
+      </p:pic>
+      <p:cxnSp>
+        <p:nvCxnSpPr>
+          <p:cNvPr id="34" name="Google Shape;508;p23">
+            <a:extLst>
+              <a:ext uri="{FF2B5EF4-FFF2-40B4-BE49-F238E27FC236}">
+                <a16:creationId xmlns:a16="http://schemas.microsoft.com/office/drawing/2014/main" id="{643EB9E5-5338-78AA-8B7C-28A676EE496D}"/>
+              </a:ext>
+            </a:extLst>
+          </p:cNvPr>
+          <p:cNvCxnSpPr>
+            <a:cxnSpLocks/>
+          </p:cNvCxnSpPr>
+          <p:nvPr/>
+        </p:nvCxnSpPr>
+        <p:spPr>
+          <a:xfrm>
+            <a:off x="4248323" y="1681900"/>
+            <a:ext cx="1146900" cy="0"/>
+          </a:xfrm>
+          <a:prstGeom prst="straightConnector1">
+            <a:avLst/>
+          </a:prstGeom>
+          <a:noFill/>
+          <a:ln w="19050" cap="flat" cmpd="sng">
+            <a:solidFill>
+              <a:schemeClr val="lt2"/>
+            </a:solidFill>
+            <a:prstDash val="dash"/>
+            <a:round/>
+            <a:headEnd type="none" w="med" len="med"/>
+            <a:tailEnd type="none" w="med" len="med"/>
+          </a:ln>
+        </p:spPr>
+      </p:cxnSp>
+      <p:sp>
+        <p:nvSpPr>
+          <p:cNvPr id="35" name="Google Shape;467;p23">
+            <a:extLst>
+              <a:ext uri="{FF2B5EF4-FFF2-40B4-BE49-F238E27FC236}">
+                <a16:creationId xmlns:a16="http://schemas.microsoft.com/office/drawing/2014/main" id="{D9AA9F85-76FA-E234-9959-EA8727233E3A}"/>
+              </a:ext>
+            </a:extLst>
+          </p:cNvPr>
+          <p:cNvSpPr/>
+          <p:nvPr/>
+        </p:nvSpPr>
+        <p:spPr>
+          <a:xfrm>
+            <a:off x="5013891" y="2803400"/>
+            <a:ext cx="1466700" cy="1800600"/>
+          </a:xfrm>
+          <a:prstGeom prst="rect">
+            <a:avLst/>
+          </a:prstGeom>
+          <a:noFill/>
+          <a:ln w="19050" cap="flat" cmpd="sng">
+            <a:solidFill>
+              <a:schemeClr val="lt2"/>
+            </a:solidFill>
+            <a:prstDash val="solid"/>
+            <a:round/>
+            <a:headEnd type="none" w="sm" len="sm"/>
+            <a:tailEnd type="none" w="sm" len="sm"/>
+          </a:ln>
+        </p:spPr>
+        <p:txBody>
+          <a:bodyPr spcFirstLastPara="1" wrap="square" lIns="91425" tIns="91425" rIns="91425" bIns="91425" anchor="ctr" anchorCtr="0">
+            <a:noAutofit/>
+          </a:bodyPr>
+          <a:lstStyle/>
+          <a:p>
+            <a:pPr marL="0" lvl="0" indent="0" algn="l" rtl="0">
+              <a:spcBef>
+                <a:spcPts val="0"/>
+              </a:spcBef>
+              <a:spcAft>
+                <a:spcPts val="0"/>
+              </a:spcAft>
+              <a:buNone/>
+            </a:pPr>
+            <a:endParaRPr/>
+          </a:p>
+        </p:txBody>
+      </p:sp>
+      <p:sp>
+        <p:nvSpPr>
+          <p:cNvPr id="36" name="Google Shape;468;p23">
+            <a:extLst>
+              <a:ext uri="{FF2B5EF4-FFF2-40B4-BE49-F238E27FC236}">
+                <a16:creationId xmlns:a16="http://schemas.microsoft.com/office/drawing/2014/main" id="{9462B72C-BBBF-F21A-8AB4-27D9D2F2264B}"/>
+              </a:ext>
+            </a:extLst>
+          </p:cNvPr>
+          <p:cNvSpPr/>
+          <p:nvPr/>
+        </p:nvSpPr>
+        <p:spPr>
+          <a:xfrm>
+            <a:off x="5330691" y="2147250"/>
+            <a:ext cx="833100" cy="833100"/>
+          </a:xfrm>
+          <a:prstGeom prst="rect">
+            <a:avLst/>
+          </a:prstGeom>
+          <a:solidFill>
+            <a:srgbClr val="00B050"/>
+          </a:solidFill>
+          <a:ln>
+            <a:noFill/>
+          </a:ln>
+        </p:spPr>
+        <p:txBody>
+          <a:bodyPr spcFirstLastPara="1" wrap="square" lIns="91425" tIns="91425" rIns="91425" bIns="91425" anchor="ctr" anchorCtr="0">
+            <a:noAutofit/>
+          </a:bodyPr>
+          <a:lstStyle/>
+          <a:p>
+            <a:pPr marL="0" lvl="0" indent="0" algn="l" rtl="0">
+              <a:spcBef>
+                <a:spcPts val="0"/>
+              </a:spcBef>
+              <a:spcAft>
+                <a:spcPts val="0"/>
+              </a:spcAft>
+              <a:buNone/>
+            </a:pPr>
+            <a:endParaRPr/>
+          </a:p>
+        </p:txBody>
+      </p:sp>
+      <p:grpSp>
+        <p:nvGrpSpPr>
+          <p:cNvPr id="37" name="Google Shape;492;p23">
+            <a:extLst>
+              <a:ext uri="{FF2B5EF4-FFF2-40B4-BE49-F238E27FC236}">
+                <a16:creationId xmlns:a16="http://schemas.microsoft.com/office/drawing/2014/main" id="{8514ACD5-D14E-2F2B-43C1-EEC95CE934EE}"/>
+              </a:ext>
+            </a:extLst>
+          </p:cNvPr>
+          <p:cNvGrpSpPr/>
+          <p:nvPr/>
+        </p:nvGrpSpPr>
+        <p:grpSpPr>
+          <a:xfrm>
+            <a:off x="5013861" y="1453300"/>
+            <a:ext cx="1466760" cy="2696497"/>
+            <a:chOff x="1569551" y="1458000"/>
+            <a:chExt cx="1466760" cy="2696497"/>
+          </a:xfrm>
+        </p:grpSpPr>
+        <p:grpSp>
+          <p:nvGrpSpPr>
+            <p:cNvPr id="38" name="Google Shape;493;p23">
+              <a:extLst>
+                <a:ext uri="{FF2B5EF4-FFF2-40B4-BE49-F238E27FC236}">
+                  <a16:creationId xmlns:a16="http://schemas.microsoft.com/office/drawing/2014/main" id="{6F62C98A-ABB9-CB4A-BD0B-DB0A8C78A1C7}"/>
+                </a:ext>
+              </a:extLst>
+            </p:cNvPr>
+            <p:cNvGrpSpPr/>
+            <p:nvPr/>
+          </p:nvGrpSpPr>
+          <p:grpSpPr>
+            <a:xfrm>
+              <a:off x="1569551" y="3166425"/>
+              <a:ext cx="1466760" cy="988072"/>
+              <a:chOff x="1228602" y="3299388"/>
+              <a:chExt cx="1596908" cy="988072"/>
+            </a:xfrm>
+          </p:grpSpPr>
+          <p:sp>
+            <p:nvSpPr>
+              <p:cNvPr id="40" name="Google Shape;494;p23">
+                <a:extLst>
+                  <a:ext uri="{FF2B5EF4-FFF2-40B4-BE49-F238E27FC236}">
+                    <a16:creationId xmlns:a16="http://schemas.microsoft.com/office/drawing/2014/main" id="{01E539C4-08C0-20CA-A338-270560150CEB}"/>
+                  </a:ext>
+                </a:extLst>
+              </p:cNvPr>
+              <p:cNvSpPr txBox="1"/>
+              <p:nvPr/>
+            </p:nvSpPr>
+            <p:spPr>
+              <a:xfrm>
+                <a:off x="1228610" y="3299388"/>
+                <a:ext cx="1596900" cy="457200"/>
+              </a:xfrm>
+              <a:prstGeom prst="rect">
+                <a:avLst/>
+              </a:prstGeom>
+              <a:noFill/>
+              <a:ln>
+                <a:noFill/>
+              </a:ln>
+            </p:spPr>
+            <p:txBody>
+              <a:bodyPr spcFirstLastPara="1" wrap="square" lIns="91425" tIns="91425" rIns="91425" bIns="91425" anchor="b" anchorCtr="0">
+                <a:noAutofit/>
+              </a:bodyPr>
+              <a:lstStyle/>
+              <a:p>
+                <a:pPr marL="0" lvl="0" indent="0" algn="ctr" rtl="0">
+                  <a:spcBef>
+                    <a:spcPts val="0"/>
+                  </a:spcBef>
+                  <a:spcAft>
+                    <a:spcPts val="0"/>
+                  </a:spcAft>
+                  <a:buNone/>
+                </a:pPr>
+                <a:r>
+                  <a:rPr lang="fr-FR" sz="2000" dirty="0">
+                    <a:solidFill>
+                      <a:srgbClr val="00B050"/>
+                    </a:solidFill>
+                    <a:latin typeface="Share Tech"/>
+                    <a:ea typeface="Share Tech"/>
+                    <a:cs typeface="Share Tech"/>
+                    <a:sym typeface="Share Tech"/>
+                  </a:rPr>
+                  <a:t>Tests</a:t>
+                </a:r>
+                <a:endParaRPr sz="2000" dirty="0">
+                  <a:solidFill>
+                    <a:srgbClr val="00B050"/>
+                  </a:solidFill>
+                  <a:latin typeface="Share Tech"/>
+                  <a:ea typeface="Share Tech"/>
+                  <a:cs typeface="Share Tech"/>
+                  <a:sym typeface="Share Tech"/>
+                </a:endParaRPr>
+              </a:p>
+            </p:txBody>
+          </p:sp>
+          <p:sp>
+            <p:nvSpPr>
+              <p:cNvPr id="41" name="Google Shape;495;p23">
+                <a:extLst>
+                  <a:ext uri="{FF2B5EF4-FFF2-40B4-BE49-F238E27FC236}">
+                    <a16:creationId xmlns:a16="http://schemas.microsoft.com/office/drawing/2014/main" id="{01425C41-5AD6-8936-F970-AD2007C69A2E}"/>
+                  </a:ext>
+                </a:extLst>
+              </p:cNvPr>
+              <p:cNvSpPr txBox="1"/>
+              <p:nvPr/>
+            </p:nvSpPr>
+            <p:spPr>
+              <a:xfrm>
+                <a:off x="1228602" y="3606460"/>
+                <a:ext cx="1596900" cy="681000"/>
+              </a:xfrm>
+              <a:prstGeom prst="rect">
+                <a:avLst/>
+              </a:prstGeom>
+              <a:noFill/>
+              <a:ln>
+                <a:noFill/>
+              </a:ln>
+            </p:spPr>
+            <p:txBody>
+              <a:bodyPr spcFirstLastPara="1" wrap="square" lIns="91425" tIns="91425" rIns="91425" bIns="91425" anchor="t" anchorCtr="0">
+                <a:noAutofit/>
+              </a:bodyPr>
+              <a:lstStyle/>
+              <a:p>
+                <a:pPr marL="0" lvl="0" indent="0" algn="ctr" rtl="0">
+                  <a:spcBef>
+                    <a:spcPts val="0"/>
+                  </a:spcBef>
+                  <a:spcAft>
+                    <a:spcPts val="0"/>
+                  </a:spcAft>
+                  <a:buNone/>
+                </a:pPr>
+                <a:r>
+                  <a:rPr lang="fr-FR" sz="1300" dirty="0">
+                    <a:solidFill>
+                      <a:schemeClr val="dk1"/>
+                    </a:solidFill>
+                    <a:latin typeface="Maven Pro"/>
+                    <a:ea typeface="Maven Pro"/>
+                    <a:cs typeface="Maven Pro"/>
+                    <a:sym typeface="Maven Pro"/>
+                  </a:rPr>
+                  <a:t>des différentes parties de l’application</a:t>
+                </a:r>
+              </a:p>
+            </p:txBody>
+          </p:sp>
+        </p:grpSp>
+        <p:sp>
+          <p:nvSpPr>
+            <p:cNvPr id="39" name="Google Shape;496;p23">
+              <a:extLst>
+                <a:ext uri="{FF2B5EF4-FFF2-40B4-BE49-F238E27FC236}">
+                  <a16:creationId xmlns:a16="http://schemas.microsoft.com/office/drawing/2014/main" id="{43BAC7E7-EED4-83D1-4592-633EA7898170}"/>
+                </a:ext>
+              </a:extLst>
+            </p:cNvPr>
+            <p:cNvSpPr txBox="1"/>
+            <p:nvPr/>
+          </p:nvSpPr>
+          <p:spPr>
+            <a:xfrm>
+              <a:off x="1918625" y="1458000"/>
+              <a:ext cx="768600" cy="457200"/>
+            </a:xfrm>
+            <a:prstGeom prst="rect">
+              <a:avLst/>
+            </a:prstGeom>
+            <a:noFill/>
+            <a:ln>
+              <a:noFill/>
+            </a:ln>
+          </p:spPr>
+          <p:txBody>
+            <a:bodyPr spcFirstLastPara="1" wrap="square" lIns="91425" tIns="91425" rIns="91425" bIns="91425" anchor="ctr" anchorCtr="0">
+              <a:noAutofit/>
+            </a:bodyPr>
+            <a:lstStyle/>
+            <a:p>
+              <a:pPr marL="0" lvl="0" indent="0" algn="ctr" rtl="0">
+                <a:spcBef>
+                  <a:spcPts val="0"/>
+                </a:spcBef>
+                <a:spcAft>
+                  <a:spcPts val="0"/>
+                </a:spcAft>
+                <a:buNone/>
+              </a:pPr>
+              <a:r>
+                <a:rPr lang="en" sz="2400" dirty="0">
+                  <a:solidFill>
+                    <a:srgbClr val="00B050"/>
+                  </a:solidFill>
+                  <a:latin typeface="Share Tech"/>
+                  <a:ea typeface="Share Tech"/>
+                  <a:cs typeface="Share Tech"/>
+                  <a:sym typeface="Share Tech"/>
+                </a:rPr>
+                <a:t>03</a:t>
+              </a:r>
+              <a:endParaRPr sz="2400" dirty="0">
+                <a:solidFill>
+                  <a:srgbClr val="00B050"/>
+                </a:solidFill>
+                <a:latin typeface="Share Tech"/>
+                <a:ea typeface="Share Tech"/>
+                <a:cs typeface="Share Tech"/>
+                <a:sym typeface="Share Tech"/>
+              </a:endParaRPr>
+            </a:p>
+          </p:txBody>
+        </p:sp>
+      </p:grpSp>
+      <p:cxnSp>
+        <p:nvCxnSpPr>
+          <p:cNvPr id="42" name="Google Shape;509;p23">
+            <a:extLst>
+              <a:ext uri="{FF2B5EF4-FFF2-40B4-BE49-F238E27FC236}">
+                <a16:creationId xmlns:a16="http://schemas.microsoft.com/office/drawing/2014/main" id="{6865BA76-60EC-C0BB-B413-0B40BC1EED3A}"/>
+              </a:ext>
+            </a:extLst>
+          </p:cNvPr>
+          <p:cNvCxnSpPr>
+            <a:cxnSpLocks/>
+            <a:stCxn id="39" idx="2"/>
+            <a:endCxn id="36" idx="0"/>
+          </p:cNvCxnSpPr>
+          <p:nvPr/>
+        </p:nvCxnSpPr>
+        <p:spPr>
+          <a:xfrm>
+            <a:off x="5747235" y="1910500"/>
+            <a:ext cx="0" cy="236700"/>
+          </a:xfrm>
+          <a:prstGeom prst="straightConnector1">
+            <a:avLst/>
+          </a:prstGeom>
+          <a:noFill/>
+          <a:ln w="19050" cap="flat" cmpd="sng">
+            <a:solidFill>
+              <a:schemeClr val="lt2"/>
+            </a:solidFill>
+            <a:prstDash val="solid"/>
+            <a:round/>
+            <a:headEnd type="none" w="med" len="med"/>
+            <a:tailEnd type="oval" w="med" len="med"/>
+          </a:ln>
+        </p:spPr>
+      </p:cxnSp>
+      <p:cxnSp>
+        <p:nvCxnSpPr>
+          <p:cNvPr id="44" name="Google Shape;508;p23">
+            <a:extLst>
+              <a:ext uri="{FF2B5EF4-FFF2-40B4-BE49-F238E27FC236}">
+                <a16:creationId xmlns:a16="http://schemas.microsoft.com/office/drawing/2014/main" id="{B63FF989-B6C4-94AB-675B-55B99C6EC90C}"/>
+              </a:ext>
+            </a:extLst>
+          </p:cNvPr>
+          <p:cNvCxnSpPr>
+            <a:cxnSpLocks/>
+          </p:cNvCxnSpPr>
+          <p:nvPr/>
+        </p:nvCxnSpPr>
+        <p:spPr>
+          <a:xfrm>
+            <a:off x="6140157" y="1681900"/>
+            <a:ext cx="1146900" cy="0"/>
+          </a:xfrm>
+          <a:prstGeom prst="straightConnector1">
+            <a:avLst/>
+          </a:prstGeom>
+          <a:noFill/>
+          <a:ln w="19050" cap="flat" cmpd="sng">
+            <a:solidFill>
+              <a:schemeClr val="lt2"/>
+            </a:solidFill>
+            <a:prstDash val="dash"/>
+            <a:round/>
+            <a:headEnd type="none" w="med" len="med"/>
+            <a:tailEnd type="none" w="med" len="med"/>
+          </a:ln>
+        </p:spPr>
+      </p:cxnSp>
+      <p:sp>
+        <p:nvSpPr>
+          <p:cNvPr id="51" name="Google Shape;467;p23"/>
+          <p:cNvSpPr/>
+          <p:nvPr/>
+        </p:nvSpPr>
+        <p:spPr>
+          <a:xfrm>
+            <a:off x="6928622" y="2800954"/>
+            <a:ext cx="1466700" cy="1800600"/>
+          </a:xfrm>
+          <a:prstGeom prst="rect">
+            <a:avLst/>
+          </a:prstGeom>
+          <a:noFill/>
+          <a:ln w="19050" cap="flat" cmpd="sng">
+            <a:solidFill>
+              <a:schemeClr val="lt2"/>
+            </a:solidFill>
+            <a:prstDash val="solid"/>
+            <a:round/>
+            <a:headEnd type="none" w="sm" len="sm"/>
+            <a:tailEnd type="none" w="sm" len="sm"/>
+          </a:ln>
+        </p:spPr>
+        <p:txBody>
+          <a:bodyPr spcFirstLastPara="1" wrap="square" lIns="91425" tIns="91425" rIns="91425" bIns="91425" anchor="ctr" anchorCtr="0">
+            <a:noAutofit/>
+          </a:bodyPr>
+          <a:lstStyle/>
+          <a:p>
+            <a:pPr marL="0" lvl="0" indent="0" algn="l" rtl="0">
+              <a:spcBef>
+                <a:spcPts val="0"/>
+              </a:spcBef>
+              <a:spcAft>
+                <a:spcPts val="0"/>
+              </a:spcAft>
+              <a:buNone/>
+            </a:pPr>
+            <a:endParaRPr/>
+          </a:p>
+        </p:txBody>
+      </p:sp>
+      <p:grpSp>
+        <p:nvGrpSpPr>
+          <p:cNvPr id="52" name="Google Shape;492;p23"/>
+          <p:cNvGrpSpPr/>
+          <p:nvPr/>
+        </p:nvGrpSpPr>
+        <p:grpSpPr>
+          <a:xfrm>
+            <a:off x="6928591" y="1450854"/>
+            <a:ext cx="1466760" cy="2691855"/>
+            <a:chOff x="1569550" y="1458000"/>
+            <a:chExt cx="1466760" cy="2691855"/>
+          </a:xfrm>
+        </p:grpSpPr>
+        <p:grpSp>
+          <p:nvGrpSpPr>
+            <p:cNvPr id="53" name="Google Shape;493;p23"/>
+            <p:cNvGrpSpPr/>
+            <p:nvPr/>
+          </p:nvGrpSpPr>
+          <p:grpSpPr>
+            <a:xfrm>
+              <a:off x="1569550" y="3166425"/>
+              <a:ext cx="1466760" cy="983430"/>
+              <a:chOff x="1228601" y="3299388"/>
+              <a:chExt cx="1596908" cy="983430"/>
+            </a:xfrm>
+          </p:grpSpPr>
+          <p:sp>
+            <p:nvSpPr>
+              <p:cNvPr id="55" name="Google Shape;494;p23"/>
+              <p:cNvSpPr txBox="1"/>
+              <p:nvPr/>
+            </p:nvSpPr>
+            <p:spPr>
+              <a:xfrm>
+                <a:off x="1228610" y="3299388"/>
+                <a:ext cx="1596899" cy="457200"/>
+              </a:xfrm>
+              <a:prstGeom prst="rect">
+                <a:avLst/>
+              </a:prstGeom>
+              <a:noFill/>
+              <a:ln>
+                <a:noFill/>
+              </a:ln>
+            </p:spPr>
+            <p:txBody>
+              <a:bodyPr spcFirstLastPara="1" wrap="square" lIns="91425" tIns="91425" rIns="91425" bIns="91425" anchor="b" anchorCtr="0">
+                <a:noAutofit/>
+              </a:bodyPr>
+              <a:lstStyle/>
+              <a:p>
+                <a:pPr marL="0" lvl="0" indent="0" algn="ctr" rtl="0">
+                  <a:spcBef>
+                    <a:spcPts val="0"/>
+                  </a:spcBef>
+                  <a:spcAft>
+                    <a:spcPts val="0"/>
+                  </a:spcAft>
+                  <a:buNone/>
+                </a:pPr>
+                <a:r>
+                  <a:rPr lang="fr-FR" sz="2000" dirty="0">
+                    <a:solidFill>
+                      <a:schemeClr val="bg1">
+                        <a:lumMod val="50000"/>
+                        <a:lumOff val="50000"/>
+                      </a:schemeClr>
+                    </a:solidFill>
+                    <a:latin typeface="Share Tech"/>
+                    <a:ea typeface="Share Tech"/>
+                    <a:cs typeface="Share Tech"/>
+                    <a:sym typeface="Share Tech"/>
+                  </a:rPr>
+                  <a:t>CI/CD</a:t>
+                </a:r>
+                <a:endParaRPr sz="2000" dirty="0">
+                  <a:solidFill>
+                    <a:schemeClr val="bg1">
+                      <a:lumMod val="50000"/>
+                      <a:lumOff val="50000"/>
+                    </a:schemeClr>
+                  </a:solidFill>
+                  <a:latin typeface="Share Tech"/>
+                  <a:ea typeface="Share Tech"/>
+                  <a:cs typeface="Share Tech"/>
+                  <a:sym typeface="Share Tech"/>
+                </a:endParaRPr>
+              </a:p>
+            </p:txBody>
+          </p:sp>
+          <p:sp>
+            <p:nvSpPr>
+              <p:cNvPr id="56" name="Google Shape;495;p23"/>
+              <p:cNvSpPr txBox="1"/>
+              <p:nvPr/>
+            </p:nvSpPr>
+            <p:spPr>
+              <a:xfrm>
+                <a:off x="1228601" y="3601818"/>
+                <a:ext cx="1596900" cy="681000"/>
+              </a:xfrm>
+              <a:prstGeom prst="rect">
+                <a:avLst/>
+              </a:prstGeom>
+              <a:noFill/>
+              <a:ln>
+                <a:noFill/>
+              </a:ln>
+            </p:spPr>
+            <p:txBody>
+              <a:bodyPr spcFirstLastPara="1" wrap="square" lIns="91425" tIns="91425" rIns="91425" bIns="91425" anchor="t" anchorCtr="0">
+                <a:noAutofit/>
+              </a:bodyPr>
+              <a:lstStyle/>
+              <a:p>
+                <a:pPr marL="0" lvl="0" indent="0" algn="ctr" rtl="0">
+                  <a:spcBef>
+                    <a:spcPts val="0"/>
+                  </a:spcBef>
+                  <a:spcAft>
+                    <a:spcPts val="0"/>
+                  </a:spcAft>
+                  <a:buNone/>
+                </a:pPr>
+                <a:r>
+                  <a:rPr lang="fr-FR" sz="1300" dirty="0">
+                    <a:solidFill>
+                      <a:schemeClr val="dk1"/>
+                    </a:solidFill>
+                    <a:latin typeface="Maven Pro"/>
+                    <a:ea typeface="Maven Pro"/>
+                    <a:cs typeface="Maven Pro"/>
+                    <a:sym typeface="Maven Pro"/>
+                  </a:rPr>
+                  <a:t>mis en place, ainsi que son fonctionnement</a:t>
+                </a:r>
+                <a:endParaRPr sz="1300" dirty="0">
+                  <a:solidFill>
+                    <a:schemeClr val="dk1"/>
+                  </a:solidFill>
+                  <a:latin typeface="Maven Pro"/>
+                  <a:ea typeface="Maven Pro"/>
+                  <a:cs typeface="Maven Pro"/>
+                  <a:sym typeface="Maven Pro"/>
+                </a:endParaRPr>
+              </a:p>
+            </p:txBody>
+          </p:sp>
+        </p:grpSp>
+        <p:sp>
+          <p:nvSpPr>
+            <p:cNvPr id="54" name="Google Shape;496;p23"/>
+            <p:cNvSpPr txBox="1"/>
+            <p:nvPr/>
+          </p:nvSpPr>
+          <p:spPr>
+            <a:xfrm>
+              <a:off x="1918625" y="1458000"/>
+              <a:ext cx="768600" cy="457200"/>
+            </a:xfrm>
+            <a:prstGeom prst="rect">
+              <a:avLst/>
+            </a:prstGeom>
+            <a:noFill/>
+            <a:ln>
+              <a:noFill/>
+            </a:ln>
+          </p:spPr>
+          <p:txBody>
+            <a:bodyPr spcFirstLastPara="1" wrap="square" lIns="91425" tIns="91425" rIns="91425" bIns="91425" anchor="ctr" anchorCtr="0">
+              <a:noAutofit/>
+            </a:bodyPr>
+            <a:lstStyle/>
+            <a:p>
+              <a:pPr marL="0" lvl="0" indent="0" algn="ctr" rtl="0">
+                <a:spcBef>
+                  <a:spcPts val="0"/>
+                </a:spcBef>
+                <a:spcAft>
+                  <a:spcPts val="0"/>
+                </a:spcAft>
+                <a:buNone/>
+              </a:pPr>
+              <a:r>
+                <a:rPr lang="en" sz="2400" dirty="0">
+                  <a:solidFill>
+                    <a:schemeClr val="bg1">
+                      <a:lumMod val="50000"/>
+                      <a:lumOff val="50000"/>
+                    </a:schemeClr>
+                  </a:solidFill>
+                  <a:latin typeface="Share Tech"/>
+                  <a:ea typeface="Share Tech"/>
+                  <a:cs typeface="Share Tech"/>
+                  <a:sym typeface="Share Tech"/>
+                </a:rPr>
+                <a:t>04</a:t>
+              </a:r>
+              <a:endParaRPr sz="2400" dirty="0">
+                <a:solidFill>
+                  <a:schemeClr val="bg1">
+                    <a:lumMod val="50000"/>
+                    <a:lumOff val="50000"/>
+                  </a:schemeClr>
+                </a:solidFill>
+                <a:latin typeface="Share Tech"/>
+                <a:ea typeface="Share Tech"/>
+                <a:cs typeface="Share Tech"/>
+                <a:sym typeface="Share Tech"/>
+              </a:endParaRPr>
+            </a:p>
+          </p:txBody>
+        </p:sp>
+      </p:grpSp>
+      <p:cxnSp>
+        <p:nvCxnSpPr>
+          <p:cNvPr id="57" name="Google Shape;509;p23"/>
+          <p:cNvCxnSpPr>
+            <a:cxnSpLocks/>
+            <a:stCxn id="54" idx="2"/>
+          </p:cNvCxnSpPr>
+          <p:nvPr/>
+        </p:nvCxnSpPr>
+        <p:spPr>
+          <a:xfrm>
+            <a:off x="7661966" y="1908054"/>
+            <a:ext cx="0" cy="236700"/>
+          </a:xfrm>
+          <a:prstGeom prst="straightConnector1">
+            <a:avLst/>
+          </a:prstGeom>
+          <a:noFill/>
+          <a:ln w="19050" cap="flat" cmpd="sng">
+            <a:solidFill>
+              <a:schemeClr val="lt2"/>
+            </a:solidFill>
+            <a:prstDash val="solid"/>
+            <a:round/>
+            <a:headEnd type="none" w="med" len="med"/>
+            <a:tailEnd type="oval" w="med" len="med"/>
+          </a:ln>
+        </p:spPr>
+      </p:cxnSp>
+      <p:sp>
+        <p:nvSpPr>
+          <p:cNvPr id="58" name="Google Shape;468;p23"/>
+          <p:cNvSpPr/>
+          <p:nvPr/>
+        </p:nvSpPr>
+        <p:spPr>
+          <a:xfrm>
+            <a:off x="7245422" y="2144804"/>
+            <a:ext cx="833100" cy="833100"/>
+          </a:xfrm>
+          <a:prstGeom prst="rect">
+            <a:avLst/>
+          </a:prstGeom>
+          <a:solidFill>
+            <a:schemeClr val="bg1">
+              <a:lumMod val="50000"/>
+              <a:lumOff val="50000"/>
+            </a:schemeClr>
+          </a:solidFill>
+          <a:ln>
+            <a:noFill/>
+          </a:ln>
+        </p:spPr>
+        <p:txBody>
+          <a:bodyPr spcFirstLastPara="1" wrap="square" lIns="91425" tIns="91425" rIns="91425" bIns="91425" anchor="ctr" anchorCtr="0">
+            <a:noAutofit/>
+          </a:bodyPr>
+          <a:lstStyle/>
+          <a:p>
+            <a:pPr marL="0" lvl="0" indent="0" algn="l" rtl="0">
+              <a:spcBef>
+                <a:spcPts val="0"/>
+              </a:spcBef>
+              <a:spcAft>
+                <a:spcPts val="0"/>
+              </a:spcAft>
+              <a:buNone/>
+            </a:pPr>
+            <a:endParaRPr dirty="0"/>
+          </a:p>
+        </p:txBody>
+      </p:sp>
+      <p:pic>
+        <p:nvPicPr>
+          <p:cNvPr id="62" name="Graphique 61" descr="Fiole contour">
+            <a:extLst>
+              <a:ext uri="{FF2B5EF4-FFF2-40B4-BE49-F238E27FC236}">
+                <a16:creationId xmlns:a16="http://schemas.microsoft.com/office/drawing/2014/main" id="{2093F441-C465-D61A-2BC3-49DCC8EF9A07}"/>
+              </a:ext>
+            </a:extLst>
+          </p:cNvPr>
+          <p:cNvPicPr>
+            <a:picLocks noChangeAspect="1"/>
+          </p:cNvPicPr>
+          <p:nvPr/>
+        </p:nvPicPr>
+        <p:blipFill>
+          <a:blip r:embed="rId7">
+            <a:extLst>
+              <a:ext uri="{96DAC541-7B7A-43D3-8B79-37D633B846F1}">
+                <asvg:svgBlip xmlns:asvg="http://schemas.microsoft.com/office/drawing/2016/SVG/main" r:embed="rId8"/>
+              </a:ext>
+            </a:extLst>
+          </a:blip>
+          <a:stretch>
+            <a:fillRect/>
+          </a:stretch>
+        </p:blipFill>
+        <p:spPr>
+          <a:xfrm>
+            <a:off x="5374725" y="2226087"/>
+            <a:ext cx="726981" cy="726981"/>
+          </a:xfrm>
+          <a:prstGeom prst="rect">
+            <a:avLst/>
+          </a:prstGeom>
+        </p:spPr>
+      </p:pic>
+      <p:pic>
+        <p:nvPicPr>
+          <p:cNvPr id="1030" name="Picture 6" descr="GitLab logo in transparent PNG and vectorized SVG formats">
+            <a:extLst>
+              <a:ext uri="{FF2B5EF4-FFF2-40B4-BE49-F238E27FC236}">
+                <a16:creationId xmlns:a16="http://schemas.microsoft.com/office/drawing/2014/main" id="{00E91AF6-E7E2-F421-FEBA-C8D9AC5526F5}"/>
+              </a:ext>
+            </a:extLst>
+          </p:cNvPr>
+          <p:cNvPicPr>
+            <a:picLocks noChangeAspect="1" noChangeArrowheads="1"/>
+          </p:cNvPicPr>
+          <p:nvPr/>
+        </p:nvPicPr>
+        <p:blipFill>
+          <a:blip r:embed="rId9">
+            <a:extLst>
+              <a:ext uri="{28A0092B-C50C-407E-A947-70E740481C1C}">
+                <a14:useLocalDpi xmlns:a14="http://schemas.microsoft.com/office/drawing/2010/main" val="0"/>
+              </a:ext>
+            </a:extLst>
+          </a:blip>
+          <a:srcRect/>
+          <a:stretch>
+            <a:fillRect/>
+          </a:stretch>
+        </p:blipFill>
+        <p:spPr bwMode="auto">
+          <a:xfrm>
+            <a:off x="7360467" y="2320130"/>
+            <a:ext cx="570917" cy="528657"/>
+          </a:xfrm>
+          <a:prstGeom prst="rect">
+            <a:avLst/>
+          </a:prstGeom>
+          <a:noFill/>
+          <a:extLst>
+            <a:ext uri="{909E8E84-426E-40DD-AFC4-6F175D3DCCD1}">
+              <a14:hiddenFill xmlns:a14="http://schemas.microsoft.com/office/drawing/2010/main">
+                <a:solidFill>
+                  <a:srgbClr val="FFFFFF"/>
+                </a:solidFill>
+              </a14:hiddenFill>
+            </a:ext>
+          </a:extLst>
+        </p:spPr>
+      </p:pic>
+    </p:spTree>
+    <p:extLst>
+      <p:ext uri="{BB962C8B-B14F-4D97-AF65-F5344CB8AC3E}">
+        <p14:creationId xmlns:p14="http://schemas.microsoft.com/office/powerpoint/2010/main" val="1927940920"/>
+      </p:ext>
+    </p:extLst>
+  </p:cSld>
+  <p:clrMapOvr>
+    <a:masterClrMapping/>
+  </p:clrMapOvr>
+</p:sld>
+</file>
+
+<file path=ppt/slides/slide11.xml><?xml version="1.0" encoding="utf-8"?>
+<p:sld xmlns:a="http://schemas.openxmlformats.org/drawingml/2006/main" xmlns:r="http://schemas.openxmlformats.org/officeDocument/2006/relationships" xmlns:p="http://schemas.openxmlformats.org/presentationml/2006/main">
+  <p:cSld>
+    <p:spTree>
+      <p:nvGrpSpPr>
         <p:cNvPr id="1" name="Shape 156"/>
         <p:cNvGrpSpPr/>
         <p:nvPr/>
@@ -15151,7 +16821,7 @@
                   <a:schemeClr val="accent2"/>
                 </a:solidFill>
               </a:rPr>
-              <a:t>ÉCOUTER</a:t>
+              <a:t>ÉCOUTÉ</a:t>
             </a:r>
             <a:endParaRPr dirty="0"/>
           </a:p>
@@ -16628,7 +18298,7 @@
         </p:nvSpPr>
         <p:spPr>
           <a:xfrm>
-            <a:off x="720000" y="1171029"/>
+            <a:off x="842163" y="1304740"/>
             <a:ext cx="3669120" cy="2415454"/>
           </a:xfrm>
           <a:prstGeom prst="rect">
@@ -16675,6 +18345,52 @@
               <a:rPr lang="fr-FR" dirty="0"/>
               <a:t>Modifications réalisées sur l’application </a:t>
             </a:r>
+          </a:p>
+          <a:p>
+            <a:pPr marL="323850" indent="-171450">
+              <a:spcAft>
+                <a:spcPts val="600"/>
+              </a:spcAft>
+              <a:buSzPts val="1200"/>
+            </a:pPr>
+            <a:r>
+              <a:rPr lang="fr-FR" dirty="0"/>
+              <a:t>Mise en œuvre techniques</a:t>
+            </a:r>
+          </a:p>
+          <a:p>
+            <a:pPr marL="323850" indent="-171450">
+              <a:spcAft>
+                <a:spcPts val="600"/>
+              </a:spcAft>
+              <a:buSzPts val="1200"/>
+            </a:pPr>
+            <a:r>
+              <a:rPr lang="fr-FR" dirty="0"/>
+              <a:t>Temps passé sur le projet</a:t>
+            </a:r>
+          </a:p>
+          <a:p>
+            <a:pPr marL="323850" indent="-171450">
+              <a:spcAft>
+                <a:spcPts val="600"/>
+              </a:spcAft>
+              <a:buSzPts val="1200"/>
+            </a:pPr>
+            <a:r>
+              <a:rPr lang="fr-FR" dirty="0"/>
+              <a:t>Conclusion</a:t>
+            </a:r>
+          </a:p>
+          <a:p>
+            <a:pPr marL="152400" indent="0">
+              <a:spcAft>
+                <a:spcPts val="600"/>
+              </a:spcAft>
+              <a:buSzPts val="1200"/>
+              <a:buNone/>
+            </a:pPr>
+            <a:endParaRPr lang="fr-FR" dirty="0"/>
           </a:p>
         </p:txBody>
       </p:sp>
@@ -17285,7 +19001,7 @@
         </p:nvSpPr>
         <p:spPr>
           <a:xfrm>
-            <a:off x="4572000" y="1215750"/>
+            <a:off x="4511283" y="1411858"/>
             <a:ext cx="3669120" cy="2415454"/>
           </a:xfrm>
           <a:prstGeom prst="rect">
@@ -17554,34 +19270,7 @@
               </a:spcAft>
               <a:buSzPts val="1200"/>
             </a:pPr>
-            <a:r>
-              <a:rPr lang="fr-FR" dirty="0"/>
-              <a:t>Mise en œuvre techniques</a:t>
-            </a:r>
-          </a:p>
-          <a:p>
-            <a:pPr marL="323850" indent="-171450">
-              <a:spcAft>
-                <a:spcPts val="600"/>
-              </a:spcAft>
-              <a:buSzPts val="1200"/>
-            </a:pPr>
-            <a:r>
-              <a:rPr lang="fr-FR" dirty="0"/>
-              <a:t>Temps passé sur le projet</a:t>
-            </a:r>
-          </a:p>
-          <a:p>
-            <a:pPr marL="323850" indent="-171450">
-              <a:spcAft>
-                <a:spcPts val="600"/>
-              </a:spcAft>
-              <a:buSzPts val="1200"/>
-            </a:pPr>
-            <a:r>
-              <a:rPr lang="fr-FR" dirty="0"/>
-              <a:t>Conclusion</a:t>
-            </a:r>
+            <a:endParaRPr lang="fr-FR" dirty="0"/>
           </a:p>
         </p:txBody>
       </p:sp>
@@ -19478,9 +21167,15 @@
           <a:bodyPr/>
           <a:lstStyle/>
           <a:p>
+            <a:pPr marL="323850" indent="-171450">
+              <a:spcAft>
+                <a:spcPts val="600"/>
+              </a:spcAft>
+              <a:buSzPts val="1200"/>
+            </a:pPr>
             <a:r>
               <a:rPr lang="fr-FR" dirty="0"/>
-              <a:t>Mise en œuvre technique</a:t>
+              <a:t>Modifications réalisées sur l’application </a:t>
             </a:r>
           </a:p>
         </p:txBody>
@@ -19527,7 +21222,7 @@
                   <a:srgbClr val="F8F8F8"/>
                 </a:solidFill>
               </a:rPr>
-              <a:t>Test unitaire</a:t>
+              <a:t>Correction de code</a:t>
             </a:r>
           </a:p>
           <a:p>
@@ -19537,7 +21232,227 @@
                   <a:srgbClr val="F8F8F8"/>
                 </a:solidFill>
               </a:rPr>
-              <a:t>Test d’intégration</a:t>
+              <a:t>Ajout de la page des paramètres de compte</a:t>
+            </a:r>
+          </a:p>
+          <a:p>
+            <a:endParaRPr lang="fr-FR" dirty="0">
+              <a:solidFill>
+                <a:srgbClr val="F8F8F8"/>
+              </a:solidFill>
+            </a:endParaRPr>
+          </a:p>
+          <a:p>
+            <a:pPr marL="139700" indent="0">
+              <a:buNone/>
+            </a:pPr>
+            <a:endParaRPr lang="fr-FR" dirty="0">
+              <a:solidFill>
+                <a:srgbClr val="F8F8F8"/>
+              </a:solidFill>
+            </a:endParaRPr>
+          </a:p>
+        </p:txBody>
+      </p:sp>
+      <p:sp>
+        <p:nvSpPr>
+          <p:cNvPr id="4" name="ZoneTexte 3">
+            <a:extLst>
+              <a:ext uri="{FF2B5EF4-FFF2-40B4-BE49-F238E27FC236}">
+                <a16:creationId xmlns:a16="http://schemas.microsoft.com/office/drawing/2014/main" id="{73E464AB-8AEC-94F7-9C46-FE53FBCD27E6}"/>
+              </a:ext>
+            </a:extLst>
+          </p:cNvPr>
+          <p:cNvSpPr txBox="1"/>
+          <p:nvPr/>
+        </p:nvSpPr>
+        <p:spPr>
+          <a:xfrm>
+            <a:off x="8781856" y="4806393"/>
+            <a:ext cx="362144" cy="261610"/>
+          </a:xfrm>
+          <a:prstGeom prst="rect">
+            <a:avLst/>
+          </a:prstGeom>
+          <a:noFill/>
+        </p:spPr>
+        <p:txBody>
+          <a:bodyPr wrap="square" rtlCol="0">
+            <a:spAutoFit/>
+          </a:bodyPr>
+          <a:lstStyle/>
+          <a:p>
+            <a:r>
+              <a:rPr lang="fr-FR" sz="1100" dirty="0">
+                <a:solidFill>
+                  <a:schemeClr val="tx1"/>
+                </a:solidFill>
+                <a:latin typeface="Maven Pro" panose="020B0604020202020204" charset="0"/>
+              </a:rPr>
+              <a:t>5</a:t>
+            </a:r>
+          </a:p>
+        </p:txBody>
+      </p:sp>
+      <p:pic>
+        <p:nvPicPr>
+          <p:cNvPr id="10" name="Image 9">
+            <a:extLst>
+              <a:ext uri="{FF2B5EF4-FFF2-40B4-BE49-F238E27FC236}">
+                <a16:creationId xmlns:a16="http://schemas.microsoft.com/office/drawing/2014/main" id="{56550577-D252-EFD6-2B79-A70B17429F73}"/>
+              </a:ext>
+            </a:extLst>
+          </p:cNvPr>
+          <p:cNvPicPr>
+            <a:picLocks noChangeAspect="1"/>
+          </p:cNvPicPr>
+          <p:nvPr/>
+        </p:nvPicPr>
+        <p:blipFill rotWithShape="1">
+          <a:blip r:embed="rId2"/>
+          <a:srcRect l="21438" t="16210" r="20516" b="12852"/>
+          <a:stretch/>
+        </p:blipFill>
+        <p:spPr>
+          <a:xfrm>
+            <a:off x="5528078" y="1195749"/>
+            <a:ext cx="2895923" cy="3510028"/>
+          </a:xfrm>
+          <a:prstGeom prst="roundRect">
+            <a:avLst>
+              <a:gd name="adj" fmla="val 8594"/>
+            </a:avLst>
+          </a:prstGeom>
+          <a:solidFill>
+            <a:srgbClr val="FFFFFF">
+              <a:shade val="85000"/>
+            </a:srgbClr>
+          </a:solidFill>
+          <a:ln>
+            <a:noFill/>
+          </a:ln>
+          <a:effectLst>
+            <a:reflection blurRad="12700" stA="38000" endPos="28000" dist="5000" dir="5400000" sy="-100000" algn="bl" rotWithShape="0"/>
+          </a:effectLst>
+        </p:spPr>
+      </p:pic>
+    </p:spTree>
+    <p:extLst>
+      <p:ext uri="{BB962C8B-B14F-4D97-AF65-F5344CB8AC3E}">
+        <p14:creationId xmlns:p14="http://schemas.microsoft.com/office/powerpoint/2010/main" val="3303616370"/>
+      </p:ext>
+    </p:extLst>
+  </p:cSld>
+  <p:clrMapOvr>
+    <a:masterClrMapping/>
+  </p:clrMapOvr>
+</p:sld>
+</file>
+
+<file path=ppt/slides/slide6.xml><?xml version="1.0" encoding="utf-8"?>
+<p:sld xmlns:a="http://schemas.openxmlformats.org/drawingml/2006/main" xmlns:r="http://schemas.openxmlformats.org/officeDocument/2006/relationships" xmlns:p="http://schemas.openxmlformats.org/presentationml/2006/main">
+  <p:cSld>
+    <p:spTree>
+      <p:nvGrpSpPr>
+        <p:cNvPr id="1" name="">
+          <a:extLst>
+            <a:ext uri="{FF2B5EF4-FFF2-40B4-BE49-F238E27FC236}">
+              <a16:creationId xmlns:a16="http://schemas.microsoft.com/office/drawing/2014/main" id="{FE6E1A45-E070-1E29-0921-DF82A8DBB38C}"/>
+            </a:ext>
+          </a:extLst>
+        </p:cNvPr>
+        <p:cNvGrpSpPr/>
+        <p:nvPr/>
+      </p:nvGrpSpPr>
+      <p:grpSpPr>
+        <a:xfrm>
+          <a:off x="0" y="0"/>
+          <a:ext cx="0" cy="0"/>
+          <a:chOff x="0" y="0"/>
+          <a:chExt cx="0" cy="0"/>
+        </a:xfrm>
+      </p:grpSpPr>
+      <p:sp>
+        <p:nvSpPr>
+          <p:cNvPr id="2" name="Titre 1">
+            <a:extLst>
+              <a:ext uri="{FF2B5EF4-FFF2-40B4-BE49-F238E27FC236}">
+                <a16:creationId xmlns:a16="http://schemas.microsoft.com/office/drawing/2014/main" id="{56F06488-DDE5-27A5-D245-8056379F9030}"/>
+              </a:ext>
+            </a:extLst>
+          </p:cNvPr>
+          <p:cNvSpPr>
+            <a:spLocks noGrp="1"/>
+          </p:cNvSpPr>
+          <p:nvPr>
+            <p:ph type="title"/>
+          </p:nvPr>
+        </p:nvSpPr>
+        <p:spPr/>
+        <p:txBody>
+          <a:bodyPr/>
+          <a:lstStyle/>
+          <a:p>
+            <a:r>
+              <a:rPr lang="fr-FR" dirty="0"/>
+              <a:t>Mise en œuvre technique</a:t>
+            </a:r>
+          </a:p>
+        </p:txBody>
+      </p:sp>
+      <p:sp>
+        <p:nvSpPr>
+          <p:cNvPr id="3" name="Sous-titre 2">
+            <a:extLst>
+              <a:ext uri="{FF2B5EF4-FFF2-40B4-BE49-F238E27FC236}">
+                <a16:creationId xmlns:a16="http://schemas.microsoft.com/office/drawing/2014/main" id="{90B45C1F-EEF0-B030-FE5A-54E2C301C448}"/>
+              </a:ext>
+            </a:extLst>
+          </p:cNvPr>
+          <p:cNvSpPr>
+            <a:spLocks noGrp="1"/>
+          </p:cNvSpPr>
+          <p:nvPr>
+            <p:ph type="subTitle" idx="1"/>
+          </p:nvPr>
+        </p:nvSpPr>
+        <p:spPr>
+          <a:xfrm>
+            <a:off x="720000" y="1653350"/>
+            <a:ext cx="2533780" cy="2298300"/>
+          </a:xfrm>
+        </p:spPr>
+        <p:txBody>
+          <a:bodyPr/>
+          <a:lstStyle/>
+          <a:p>
+            <a:pPr marL="139700" indent="0">
+              <a:buNone/>
+            </a:pPr>
+            <a:endParaRPr lang="fr-FR" dirty="0">
+              <a:solidFill>
+                <a:srgbClr val="F8F8F8"/>
+              </a:solidFill>
+            </a:endParaRPr>
+          </a:p>
+          <a:p>
+            <a:r>
+              <a:rPr lang="fr-FR" dirty="0">
+                <a:solidFill>
+                  <a:srgbClr val="F8F8F8"/>
+                </a:solidFill>
+              </a:rPr>
+              <a:t>Tests unitaires</a:t>
+            </a:r>
+          </a:p>
+          <a:p>
+            <a:r>
+              <a:rPr lang="fr-FR" dirty="0">
+                <a:solidFill>
+                  <a:srgbClr val="F8F8F8"/>
+                </a:solidFill>
+              </a:rPr>
+              <a:t>Tests d’intégrations</a:t>
             </a:r>
           </a:p>
           <a:p>
@@ -19573,6 +21488,16 @@
                 </a:solidFill>
               </a:rPr>
               <a:t>CI/CD</a:t>
+            </a:r>
+          </a:p>
+          <a:p>
+            <a:r>
+              <a:rPr lang="fr-FR" dirty="0">
+                <a:solidFill>
+                  <a:srgbClr val="F8F8F8"/>
+                </a:solidFill>
+              </a:rPr>
+              <a:t>Documentations</a:t>
             </a:r>
           </a:p>
         </p:txBody>
@@ -19612,11 +21537,124 @@
                 </a:solidFill>
                 <a:latin typeface="Maven Pro" panose="020B0604020202020204" charset="0"/>
               </a:rPr>
-              <a:t>10</a:t>
+              <a:t>6</a:t>
             </a:r>
           </a:p>
         </p:txBody>
       </p:sp>
+      <p:pic>
+        <p:nvPicPr>
+          <p:cNvPr id="7" name="Graphique 6" descr="Fiole avec un remplissage uni">
+            <a:extLst>
+              <a:ext uri="{FF2B5EF4-FFF2-40B4-BE49-F238E27FC236}">
+                <a16:creationId xmlns:a16="http://schemas.microsoft.com/office/drawing/2014/main" id="{1389A39E-BC41-B764-8810-3E7310923404}"/>
+              </a:ext>
+            </a:extLst>
+          </p:cNvPr>
+          <p:cNvPicPr>
+            <a:picLocks noChangeAspect="1"/>
+          </p:cNvPicPr>
+          <p:nvPr/>
+        </p:nvPicPr>
+        <p:blipFill>
+          <a:blip r:embed="rId2">
+            <a:extLst>
+              <a:ext uri="{96DAC541-7B7A-43D3-8B79-37D633B846F1}">
+                <asvg:svgBlip xmlns:asvg="http://schemas.microsoft.com/office/drawing/2016/SVG/main" r:embed="rId3"/>
+              </a:ext>
+            </a:extLst>
+          </a:blip>
+          <a:stretch>
+            <a:fillRect/>
+          </a:stretch>
+        </p:blipFill>
+        <p:spPr>
+          <a:xfrm rot="1322917">
+            <a:off x="4179782" y="1260679"/>
+            <a:ext cx="1339399" cy="1339399"/>
+          </a:xfrm>
+          <a:prstGeom prst="rect">
+            <a:avLst/>
+          </a:prstGeom>
+        </p:spPr>
+      </p:pic>
+      <p:pic>
+        <p:nvPicPr>
+          <p:cNvPr id="1026" name="Picture 2" descr="Docker – Logos Download">
+            <a:extLst>
+              <a:ext uri="{FF2B5EF4-FFF2-40B4-BE49-F238E27FC236}">
+                <a16:creationId xmlns:a16="http://schemas.microsoft.com/office/drawing/2014/main" id="{77DC7DE0-7D72-9A9A-CBCE-CF767A3C5955}"/>
+              </a:ext>
+            </a:extLst>
+          </p:cNvPr>
+          <p:cNvPicPr>
+            <a:picLocks noChangeAspect="1" noChangeArrowheads="1"/>
+          </p:cNvPicPr>
+          <p:nvPr/>
+        </p:nvPicPr>
+        <p:blipFill>
+          <a:blip r:embed="rId4">
+            <a:extLst>
+              <a:ext uri="{28A0092B-C50C-407E-A947-70E740481C1C}">
+                <a14:useLocalDpi xmlns:a14="http://schemas.microsoft.com/office/drawing/2010/main" val="0"/>
+              </a:ext>
+            </a:extLst>
+          </a:blip>
+          <a:srcRect/>
+          <a:stretch>
+            <a:fillRect/>
+          </a:stretch>
+        </p:blipFill>
+        <p:spPr bwMode="auto">
+          <a:xfrm>
+            <a:off x="6339677" y="1112200"/>
+            <a:ext cx="1473150" cy="1236530"/>
+          </a:xfrm>
+          <a:prstGeom prst="rect">
+            <a:avLst/>
+          </a:prstGeom>
+          <a:noFill/>
+          <a:extLst>
+            <a:ext uri="{909E8E84-426E-40DD-AFC4-6F175D3DCCD1}">
+              <a14:hiddenFill xmlns:a14="http://schemas.microsoft.com/office/drawing/2010/main">
+                <a:solidFill>
+                  <a:srgbClr val="FFFFFF"/>
+                </a:solidFill>
+              </a14:hiddenFill>
+            </a:ext>
+          </a:extLst>
+        </p:spPr>
+      </p:pic>
+      <p:pic>
+        <p:nvPicPr>
+          <p:cNvPr id="9" name="Image 8" descr="Une image contenant Police, texte, Graphique, logo&#10;&#10;Description générée automatiquement">
+            <a:extLst>
+              <a:ext uri="{FF2B5EF4-FFF2-40B4-BE49-F238E27FC236}">
+                <a16:creationId xmlns:a16="http://schemas.microsoft.com/office/drawing/2014/main" id="{BA1C9912-D44C-1870-4BE5-5EC14186FE73}"/>
+              </a:ext>
+            </a:extLst>
+          </p:cNvPr>
+          <p:cNvPicPr>
+            <a:picLocks noChangeAspect="1"/>
+          </p:cNvPicPr>
+          <p:nvPr/>
+        </p:nvPicPr>
+        <p:blipFill>
+          <a:blip r:embed="rId5"/>
+          <a:stretch>
+            <a:fillRect/>
+          </a:stretch>
+        </p:blipFill>
+        <p:spPr>
+          <a:xfrm>
+            <a:off x="4436901" y="2854598"/>
+            <a:ext cx="2906642" cy="1529367"/>
+          </a:xfrm>
+          <a:prstGeom prst="rect">
+            <a:avLst/>
+          </a:prstGeom>
+        </p:spPr>
+      </p:pic>
     </p:spTree>
     <p:extLst>
       <p:ext uri="{BB962C8B-B14F-4D97-AF65-F5344CB8AC3E}">
@@ -19630,7 +21668,7 @@
 </p:sld>
 </file>
 
-<file path=ppt/slides/slide6.xml><?xml version="1.0" encoding="utf-8"?>
+<file path=ppt/slides/slide7.xml><?xml version="1.0" encoding="utf-8"?>
 <p:sld xmlns:a="http://schemas.openxmlformats.org/drawingml/2006/main" xmlns:r="http://schemas.openxmlformats.org/officeDocument/2006/relationships" xmlns:p="http://schemas.openxmlformats.org/presentationml/2006/main">
   <p:cSld>
     <p:spTree>
@@ -19716,7 +21754,7 @@
                 </a:solidFill>
                 <a:latin typeface="Maven Pro" panose="020B0604020202020204" charset="0"/>
               </a:rPr>
-              <a:t>15</a:t>
+              <a:t>7</a:t>
             </a:r>
           </a:p>
         </p:txBody>
@@ -19763,7 +21801,7 @@
 </p:sld>
 </file>
 
-<file path=ppt/slides/slide7.xml><?xml version="1.0" encoding="utf-8"?>
+<file path=ppt/slides/slide8.xml><?xml version="1.0" encoding="utf-8"?>
 <p:sld xmlns:a="http://schemas.openxmlformats.org/drawingml/2006/main" xmlns:r="http://schemas.openxmlformats.org/officeDocument/2006/relationships" xmlns:p="http://schemas.openxmlformats.org/presentationml/2006/main">
   <p:cSld>
     <p:spTree>
@@ -19882,7 +21920,7 @@
                 </a:solidFill>
                 <a:latin typeface="Maven Pro" panose="020B0604020202020204" charset="0"/>
               </a:rPr>
-              <a:t>16</a:t>
+              <a:t>8</a:t>
             </a:r>
           </a:p>
         </p:txBody>
@@ -19939,7 +21977,7 @@
 </p:sld>
 </file>
 
-<file path=ppt/slides/slide8.xml><?xml version="1.0" encoding="utf-8"?>
+<file path=ppt/slides/slide9.xml><?xml version="1.0" encoding="utf-8"?>
 <p:sld xmlns:a="http://schemas.openxmlformats.org/drawingml/2006/main" xmlns:r="http://schemas.openxmlformats.org/officeDocument/2006/relationships" xmlns:p="http://schemas.openxmlformats.org/presentationml/2006/main">
   <p:cSld>
     <p:spTree>
@@ -19991,10 +22029,10 @@
               <a:buNone/>
             </a:pPr>
             <a:r>
-              <a:rPr lang="en"/>
+              <a:rPr lang="en" dirty="0"/>
               <a:t>Conclusion</a:t>
             </a:r>
-            <a:endParaRPr/>
+            <a:endParaRPr dirty="0"/>
           </a:p>
         </p:txBody>
       </p:sp>
@@ -20640,7 +22678,7 @@
                   <a:cs typeface="Maven Pro"/>
                   <a:sym typeface="Maven Pro"/>
                 </a:rPr>
-                <a:t>dans les fonctionnalités, la sécurité, la gestion du projet et la qualité générale </a:t>
+                <a:t>dans la gestion du projet et du cycle de vie de l’application</a:t>
               </a:r>
               <a:endParaRPr dirty="0">
                 <a:solidFill>
@@ -20713,7 +22751,7 @@
                   <a:cs typeface="Share Tech"/>
                   <a:sym typeface="Share Tech"/>
                 </a:rPr>
-                <a:t>SUJET</a:t>
+                <a:t>AMÉLIORATION</a:t>
               </a:r>
               <a:endParaRPr sz="2000" dirty="0">
                 <a:solidFill>
@@ -20771,7 +22809,7 @@
                   <a:cs typeface="Maven Pro"/>
                   <a:sym typeface="Maven Pro"/>
                 </a:rPr>
-                <a:t>complexe à trouver et d’évaluer sa faisabilité</a:t>
+                <a:t>plus technique que visuelle</a:t>
               </a:r>
               <a:endParaRPr dirty="0">
                 <a:solidFill>
@@ -21044,7 +23082,7 @@
                 </a:solidFill>
                 <a:latin typeface="Maven Pro" panose="020B0604020202020204" charset="0"/>
               </a:rPr>
-              <a:t>17</a:t>
+              <a:t>9</a:t>
             </a:r>
           </a:p>
         </p:txBody>
@@ -21089,1708 +23127,6 @@
     <p:extLst>
       <p:ext uri="{BB962C8B-B14F-4D97-AF65-F5344CB8AC3E}">
         <p14:creationId xmlns:p14="http://schemas.microsoft.com/office/powerpoint/2010/main" val="561755642"/>
-      </p:ext>
-    </p:extLst>
-  </p:cSld>
-  <p:clrMapOvr>
-    <a:masterClrMapping/>
-  </p:clrMapOvr>
-</p:sld>
-</file>
-
-<file path=ppt/slides/slide9.xml><?xml version="1.0" encoding="utf-8"?>
-<p:sld xmlns:a="http://schemas.openxmlformats.org/drawingml/2006/main" xmlns:r="http://schemas.openxmlformats.org/officeDocument/2006/relationships" xmlns:p="http://schemas.openxmlformats.org/presentationml/2006/main">
-  <p:cSld>
-    <p:spTree>
-      <p:nvGrpSpPr>
-        <p:cNvPr id="1" name="Shape 465"/>
-        <p:cNvGrpSpPr/>
-        <p:nvPr/>
-      </p:nvGrpSpPr>
-      <p:grpSpPr>
-        <a:xfrm>
-          <a:off x="0" y="0"/>
-          <a:ext cx="0" cy="0"/>
-          <a:chOff x="0" y="0"/>
-          <a:chExt cx="0" cy="0"/>
-        </a:xfrm>
-      </p:grpSpPr>
-      <p:sp>
-        <p:nvSpPr>
-          <p:cNvPr id="466" name="Google Shape;466;p23"/>
-          <p:cNvSpPr txBox="1">
-            <a:spLocks noGrp="1"/>
-          </p:cNvSpPr>
-          <p:nvPr>
-            <p:ph type="title"/>
-          </p:nvPr>
-        </p:nvSpPr>
-        <p:spPr>
-          <a:xfrm>
-            <a:off x="720000" y="539500"/>
-            <a:ext cx="7704000" cy="572700"/>
-          </a:xfrm>
-          <a:prstGeom prst="rect">
-            <a:avLst/>
-          </a:prstGeom>
-        </p:spPr>
-        <p:txBody>
-          <a:bodyPr spcFirstLastPara="1" wrap="square" lIns="91425" tIns="91425" rIns="91425" bIns="91425" anchor="t" anchorCtr="0">
-            <a:noAutofit/>
-          </a:bodyPr>
-          <a:lstStyle/>
-          <a:p>
-            <a:pPr marL="0" lvl="0" indent="0" algn="l" rtl="0">
-              <a:spcBef>
-                <a:spcPts val="0"/>
-              </a:spcBef>
-              <a:spcAft>
-                <a:spcPts val="0"/>
-              </a:spcAft>
-              <a:buNone/>
-            </a:pPr>
-            <a:r>
-              <a:rPr lang="fr-FR"/>
-              <a:t>Démonstration technique</a:t>
-            </a:r>
-            <a:endParaRPr/>
-          </a:p>
-        </p:txBody>
-      </p:sp>
-      <p:sp>
-        <p:nvSpPr>
-          <p:cNvPr id="469" name="Google Shape;469;p23"/>
-          <p:cNvSpPr/>
-          <p:nvPr/>
-        </p:nvSpPr>
-        <p:spPr>
-          <a:xfrm>
-            <a:off x="1183633" y="2803400"/>
-            <a:ext cx="1466700" cy="1800600"/>
-          </a:xfrm>
-          <a:prstGeom prst="rect">
-            <a:avLst/>
-          </a:prstGeom>
-          <a:noFill/>
-          <a:ln w="19050" cap="flat" cmpd="sng">
-            <a:solidFill>
-              <a:schemeClr val="lt2"/>
-            </a:solidFill>
-            <a:prstDash val="solid"/>
-            <a:round/>
-            <a:headEnd type="none" w="sm" len="sm"/>
-            <a:tailEnd type="none" w="sm" len="sm"/>
-          </a:ln>
-        </p:spPr>
-        <p:txBody>
-          <a:bodyPr spcFirstLastPara="1" wrap="square" lIns="91425" tIns="91425" rIns="91425" bIns="91425" anchor="ctr" anchorCtr="0">
-            <a:noAutofit/>
-          </a:bodyPr>
-          <a:lstStyle/>
-          <a:p>
-            <a:pPr marL="0" lvl="0" indent="0" algn="l" rtl="0">
-              <a:spcBef>
-                <a:spcPts val="0"/>
-              </a:spcBef>
-              <a:spcAft>
-                <a:spcPts val="0"/>
-              </a:spcAft>
-              <a:buNone/>
-            </a:pPr>
-            <a:endParaRPr/>
-          </a:p>
-        </p:txBody>
-      </p:sp>
-      <p:sp>
-        <p:nvSpPr>
-          <p:cNvPr id="470" name="Google Shape;470;p23"/>
-          <p:cNvSpPr/>
-          <p:nvPr/>
-        </p:nvSpPr>
-        <p:spPr>
-          <a:xfrm>
-            <a:off x="1498074" y="2182159"/>
-            <a:ext cx="833100" cy="833100"/>
-          </a:xfrm>
-          <a:prstGeom prst="rect">
-            <a:avLst/>
-          </a:prstGeom>
-          <a:solidFill>
-            <a:schemeClr val="accent5"/>
-          </a:solidFill>
-          <a:ln>
-            <a:noFill/>
-          </a:ln>
-        </p:spPr>
-        <p:txBody>
-          <a:bodyPr spcFirstLastPara="1" wrap="square" lIns="91425" tIns="91425" rIns="91425" bIns="91425" anchor="ctr" anchorCtr="0">
-            <a:noAutofit/>
-          </a:bodyPr>
-          <a:lstStyle/>
-          <a:p>
-            <a:pPr marL="0" lvl="0" indent="0" algn="l" rtl="0">
-              <a:spcBef>
-                <a:spcPts val="0"/>
-              </a:spcBef>
-              <a:spcAft>
-                <a:spcPts val="0"/>
-              </a:spcAft>
-              <a:buNone/>
-            </a:pPr>
-            <a:endParaRPr/>
-          </a:p>
-        </p:txBody>
-      </p:sp>
-      <p:sp>
-        <p:nvSpPr>
-          <p:cNvPr id="471" name="Google Shape;471;p23"/>
-          <p:cNvSpPr/>
-          <p:nvPr/>
-        </p:nvSpPr>
-        <p:spPr>
-          <a:xfrm>
-            <a:off x="3099148" y="2803400"/>
-            <a:ext cx="1466700" cy="1800600"/>
-          </a:xfrm>
-          <a:prstGeom prst="rect">
-            <a:avLst/>
-          </a:prstGeom>
-          <a:noFill/>
-          <a:ln w="19050" cap="flat" cmpd="sng">
-            <a:solidFill>
-              <a:schemeClr val="lt2"/>
-            </a:solidFill>
-            <a:prstDash val="solid"/>
-            <a:round/>
-            <a:headEnd type="none" w="sm" len="sm"/>
-            <a:tailEnd type="none" w="sm" len="sm"/>
-          </a:ln>
-        </p:spPr>
-        <p:txBody>
-          <a:bodyPr spcFirstLastPara="1" wrap="square" lIns="91425" tIns="91425" rIns="91425" bIns="91425" anchor="ctr" anchorCtr="0">
-            <a:noAutofit/>
-          </a:bodyPr>
-          <a:lstStyle/>
-          <a:p>
-            <a:pPr marL="0" lvl="0" indent="0" algn="l" rtl="0">
-              <a:spcBef>
-                <a:spcPts val="0"/>
-              </a:spcBef>
-              <a:spcAft>
-                <a:spcPts val="0"/>
-              </a:spcAft>
-              <a:buNone/>
-            </a:pPr>
-            <a:endParaRPr/>
-          </a:p>
-        </p:txBody>
-      </p:sp>
-      <p:sp>
-        <p:nvSpPr>
-          <p:cNvPr id="472" name="Google Shape;472;p23"/>
-          <p:cNvSpPr/>
-          <p:nvPr/>
-        </p:nvSpPr>
-        <p:spPr>
-          <a:xfrm>
-            <a:off x="3415223" y="2147250"/>
-            <a:ext cx="833100" cy="833100"/>
-          </a:xfrm>
-          <a:prstGeom prst="rect">
-            <a:avLst/>
-          </a:prstGeom>
-          <a:solidFill>
-            <a:schemeClr val="accent1"/>
-          </a:solidFill>
-          <a:ln>
-            <a:noFill/>
-          </a:ln>
-        </p:spPr>
-        <p:txBody>
-          <a:bodyPr spcFirstLastPara="1" wrap="square" lIns="91425" tIns="91425" rIns="91425" bIns="91425" anchor="ctr" anchorCtr="0">
-            <a:noAutofit/>
-          </a:bodyPr>
-          <a:lstStyle/>
-          <a:p>
-            <a:pPr marL="0" lvl="0" indent="0" algn="l" rtl="0">
-              <a:spcBef>
-                <a:spcPts val="0"/>
-              </a:spcBef>
-              <a:spcAft>
-                <a:spcPts val="0"/>
-              </a:spcAft>
-              <a:buNone/>
-            </a:pPr>
-            <a:endParaRPr/>
-          </a:p>
-        </p:txBody>
-      </p:sp>
-      <p:grpSp>
-        <p:nvGrpSpPr>
-          <p:cNvPr id="497" name="Google Shape;497;p23"/>
-          <p:cNvGrpSpPr/>
-          <p:nvPr/>
-        </p:nvGrpSpPr>
-        <p:grpSpPr>
-          <a:xfrm>
-            <a:off x="1183644" y="1453300"/>
-            <a:ext cx="1466707" cy="2689409"/>
-            <a:chOff x="3838663" y="1458000"/>
-            <a:chExt cx="1466707" cy="2689409"/>
-          </a:xfrm>
-        </p:grpSpPr>
-        <p:grpSp>
-          <p:nvGrpSpPr>
-            <p:cNvPr id="498" name="Google Shape;498;p23"/>
-            <p:cNvGrpSpPr/>
-            <p:nvPr/>
-          </p:nvGrpSpPr>
-          <p:grpSpPr>
-            <a:xfrm>
-              <a:off x="3838663" y="3163974"/>
-              <a:ext cx="1466707" cy="983435"/>
-              <a:chOff x="3012024" y="3299387"/>
-              <a:chExt cx="1466707" cy="983435"/>
-            </a:xfrm>
-          </p:grpSpPr>
-          <p:sp>
-            <p:nvSpPr>
-              <p:cNvPr id="499" name="Google Shape;499;p23"/>
-              <p:cNvSpPr txBox="1"/>
-              <p:nvPr/>
-            </p:nvSpPr>
-            <p:spPr>
-              <a:xfrm>
-                <a:off x="3012031" y="3299387"/>
-                <a:ext cx="1466700" cy="457200"/>
-              </a:xfrm>
-              <a:prstGeom prst="rect">
-                <a:avLst/>
-              </a:prstGeom>
-              <a:noFill/>
-              <a:ln>
-                <a:noFill/>
-              </a:ln>
-            </p:spPr>
-            <p:txBody>
-              <a:bodyPr spcFirstLastPara="1" wrap="square" lIns="91425" tIns="91425" rIns="91425" bIns="91425" anchor="b" anchorCtr="0">
-                <a:noAutofit/>
-              </a:bodyPr>
-              <a:lstStyle/>
-              <a:p>
-                <a:pPr marL="0" lvl="0" indent="0" algn="ctr" rtl="0">
-                  <a:spcBef>
-                    <a:spcPts val="0"/>
-                  </a:spcBef>
-                  <a:spcAft>
-                    <a:spcPts val="0"/>
-                  </a:spcAft>
-                  <a:buNone/>
-                </a:pPr>
-                <a:r>
-                  <a:rPr lang="en" sz="2000" dirty="0">
-                    <a:solidFill>
-                      <a:schemeClr val="accent2">
-                        <a:lumMod val="60000"/>
-                        <a:lumOff val="40000"/>
-                      </a:schemeClr>
-                    </a:solidFill>
-                    <a:latin typeface="Share Tech"/>
-                    <a:ea typeface="Share Tech"/>
-                    <a:cs typeface="Share Tech"/>
-                    <a:sym typeface="Share Tech"/>
-                  </a:rPr>
-                  <a:t>Visualiser</a:t>
-                </a:r>
-                <a:endParaRPr sz="2000" dirty="0">
-                  <a:solidFill>
-                    <a:schemeClr val="accent2">
-                      <a:lumMod val="60000"/>
-                      <a:lumOff val="40000"/>
-                    </a:schemeClr>
-                  </a:solidFill>
-                  <a:latin typeface="Share Tech"/>
-                  <a:ea typeface="Share Tech"/>
-                  <a:cs typeface="Share Tech"/>
-                  <a:sym typeface="Share Tech"/>
-                </a:endParaRPr>
-              </a:p>
-            </p:txBody>
-          </p:sp>
-          <p:sp>
-            <p:nvSpPr>
-              <p:cNvPr id="500" name="Google Shape;500;p23"/>
-              <p:cNvSpPr txBox="1"/>
-              <p:nvPr/>
-            </p:nvSpPr>
-            <p:spPr>
-              <a:xfrm>
-                <a:off x="3012024" y="3601822"/>
-                <a:ext cx="1466700" cy="681000"/>
-              </a:xfrm>
-              <a:prstGeom prst="rect">
-                <a:avLst/>
-              </a:prstGeom>
-              <a:noFill/>
-              <a:ln>
-                <a:noFill/>
-              </a:ln>
-            </p:spPr>
-            <p:txBody>
-              <a:bodyPr spcFirstLastPara="1" wrap="square" lIns="91425" tIns="91425" rIns="91425" bIns="91425" anchor="t" anchorCtr="0">
-                <a:noAutofit/>
-              </a:bodyPr>
-              <a:lstStyle/>
-              <a:p>
-                <a:pPr marL="0" lvl="0" indent="0" algn="ctr" rtl="0">
-                  <a:spcBef>
-                    <a:spcPts val="0"/>
-                  </a:spcBef>
-                  <a:spcAft>
-                    <a:spcPts val="0"/>
-                  </a:spcAft>
-                  <a:buNone/>
-                </a:pPr>
-                <a:r>
-                  <a:rPr lang="fr-FR" sz="1300" dirty="0">
-                    <a:solidFill>
-                      <a:schemeClr val="dk1"/>
-                    </a:solidFill>
-                    <a:latin typeface="Maven Pro"/>
-                    <a:ea typeface="Maven Pro"/>
-                    <a:cs typeface="Maven Pro"/>
-                    <a:sym typeface="Maven Pro"/>
-                  </a:rPr>
-                  <a:t>l’application et ses fonctionnalités</a:t>
-                </a:r>
-                <a:endParaRPr sz="1300" dirty="0">
-                  <a:solidFill>
-                    <a:schemeClr val="dk1"/>
-                  </a:solidFill>
-                  <a:latin typeface="Maven Pro"/>
-                  <a:ea typeface="Maven Pro"/>
-                  <a:cs typeface="Maven Pro"/>
-                  <a:sym typeface="Maven Pro"/>
-                </a:endParaRPr>
-              </a:p>
-            </p:txBody>
-          </p:sp>
-        </p:grpSp>
-        <p:sp>
-          <p:nvSpPr>
-            <p:cNvPr id="501" name="Google Shape;501;p23"/>
-            <p:cNvSpPr txBox="1"/>
-            <p:nvPr/>
-          </p:nvSpPr>
-          <p:spPr>
-            <a:xfrm>
-              <a:off x="4187717" y="1458000"/>
-              <a:ext cx="768600" cy="457200"/>
-            </a:xfrm>
-            <a:prstGeom prst="rect">
-              <a:avLst/>
-            </a:prstGeom>
-            <a:noFill/>
-            <a:ln>
-              <a:noFill/>
-            </a:ln>
-          </p:spPr>
-          <p:txBody>
-            <a:bodyPr spcFirstLastPara="1" wrap="square" lIns="91425" tIns="91425" rIns="91425" bIns="91425" anchor="ctr" anchorCtr="0">
-              <a:noAutofit/>
-            </a:bodyPr>
-            <a:lstStyle/>
-            <a:p>
-              <a:pPr marL="0" lvl="0" indent="0" algn="ctr" rtl="0">
-                <a:spcBef>
-                  <a:spcPts val="0"/>
-                </a:spcBef>
-                <a:spcAft>
-                  <a:spcPts val="0"/>
-                </a:spcAft>
-                <a:buNone/>
-              </a:pPr>
-              <a:r>
-                <a:rPr lang="en" sz="2400" dirty="0">
-                  <a:solidFill>
-                    <a:schemeClr val="accent5"/>
-                  </a:solidFill>
-                  <a:latin typeface="Share Tech"/>
-                  <a:ea typeface="Share Tech"/>
-                  <a:cs typeface="Share Tech"/>
-                  <a:sym typeface="Share Tech"/>
-                </a:rPr>
-                <a:t>01</a:t>
-              </a:r>
-              <a:endParaRPr sz="2400" dirty="0">
-                <a:solidFill>
-                  <a:schemeClr val="accent5"/>
-                </a:solidFill>
-                <a:latin typeface="Share Tech"/>
-                <a:ea typeface="Share Tech"/>
-                <a:cs typeface="Share Tech"/>
-                <a:sym typeface="Share Tech"/>
-              </a:endParaRPr>
-            </a:p>
-          </p:txBody>
-        </p:sp>
-      </p:grpSp>
-      <p:grpSp>
-        <p:nvGrpSpPr>
-          <p:cNvPr id="502" name="Google Shape;502;p23"/>
-          <p:cNvGrpSpPr/>
-          <p:nvPr/>
-        </p:nvGrpSpPr>
-        <p:grpSpPr>
-          <a:xfrm>
-            <a:off x="3099146" y="1453300"/>
-            <a:ext cx="1466704" cy="2691920"/>
-            <a:chOff x="6107722" y="1458000"/>
-            <a:chExt cx="1466704" cy="2691920"/>
-          </a:xfrm>
-        </p:grpSpPr>
-        <p:grpSp>
-          <p:nvGrpSpPr>
-            <p:cNvPr id="503" name="Google Shape;503;p23"/>
-            <p:cNvGrpSpPr/>
-            <p:nvPr/>
-          </p:nvGrpSpPr>
-          <p:grpSpPr>
-            <a:xfrm>
-              <a:off x="6107722" y="3166485"/>
-              <a:ext cx="1466704" cy="983435"/>
-              <a:chOff x="6318523" y="3299387"/>
-              <a:chExt cx="1466704" cy="983435"/>
-            </a:xfrm>
-          </p:grpSpPr>
-          <p:sp>
-            <p:nvSpPr>
-              <p:cNvPr id="504" name="Google Shape;504;p23"/>
-              <p:cNvSpPr txBox="1"/>
-              <p:nvPr/>
-            </p:nvSpPr>
-            <p:spPr>
-              <a:xfrm>
-                <a:off x="6318526" y="3299387"/>
-                <a:ext cx="1466700" cy="457200"/>
-              </a:xfrm>
-              <a:prstGeom prst="rect">
-                <a:avLst/>
-              </a:prstGeom>
-              <a:noFill/>
-              <a:ln>
-                <a:noFill/>
-              </a:ln>
-            </p:spPr>
-            <p:txBody>
-              <a:bodyPr spcFirstLastPara="1" wrap="square" lIns="91425" tIns="91425" rIns="91425" bIns="91425" anchor="b" anchorCtr="0">
-                <a:noAutofit/>
-              </a:bodyPr>
-              <a:lstStyle/>
-              <a:p>
-                <a:pPr marL="0" lvl="0" indent="0" algn="ctr" rtl="0">
-                  <a:spcBef>
-                    <a:spcPts val="0"/>
-                  </a:spcBef>
-                  <a:spcAft>
-                    <a:spcPts val="0"/>
-                  </a:spcAft>
-                  <a:buNone/>
-                </a:pPr>
-                <a:r>
-                  <a:rPr lang="fr-FR" sz="2000" dirty="0">
-                    <a:solidFill>
-                      <a:schemeClr val="accent4">
-                        <a:lumMod val="60000"/>
-                        <a:lumOff val="40000"/>
-                      </a:schemeClr>
-                    </a:solidFill>
-                    <a:latin typeface="Share Tech"/>
-                    <a:ea typeface="Share Tech"/>
-                    <a:cs typeface="Share Tech"/>
-                    <a:sym typeface="Share Tech"/>
-                  </a:rPr>
-                  <a:t>Amélioration</a:t>
-                </a:r>
-                <a:endParaRPr sz="2000" dirty="0">
-                  <a:solidFill>
-                    <a:schemeClr val="accent4">
-                      <a:lumMod val="60000"/>
-                      <a:lumOff val="40000"/>
-                    </a:schemeClr>
-                  </a:solidFill>
-                  <a:latin typeface="Share Tech"/>
-                  <a:ea typeface="Share Tech"/>
-                  <a:cs typeface="Share Tech"/>
-                  <a:sym typeface="Share Tech"/>
-                </a:endParaRPr>
-              </a:p>
-            </p:txBody>
-          </p:sp>
-          <p:sp>
-            <p:nvSpPr>
-              <p:cNvPr id="505" name="Google Shape;505;p23"/>
-              <p:cNvSpPr txBox="1"/>
-              <p:nvPr/>
-            </p:nvSpPr>
-            <p:spPr>
-              <a:xfrm>
-                <a:off x="6318523" y="3601822"/>
-                <a:ext cx="1466700" cy="681000"/>
-              </a:xfrm>
-              <a:prstGeom prst="rect">
-                <a:avLst/>
-              </a:prstGeom>
-              <a:noFill/>
-              <a:ln>
-                <a:noFill/>
-              </a:ln>
-            </p:spPr>
-            <p:txBody>
-              <a:bodyPr spcFirstLastPara="1" wrap="square" lIns="91425" tIns="91425" rIns="91425" bIns="91425" anchor="t" anchorCtr="0">
-                <a:noAutofit/>
-              </a:bodyPr>
-              <a:lstStyle/>
-              <a:p>
-                <a:pPr marL="0" lvl="0" indent="0" algn="ctr" rtl="0">
-                  <a:spcBef>
-                    <a:spcPts val="0"/>
-                  </a:spcBef>
-                  <a:spcAft>
-                    <a:spcPts val="0"/>
-                  </a:spcAft>
-                  <a:buNone/>
-                </a:pPr>
-                <a:r>
-                  <a:rPr lang="fr-FR" sz="1300" dirty="0">
-                    <a:solidFill>
-                      <a:schemeClr val="dk1"/>
-                    </a:solidFill>
-                    <a:latin typeface="Maven Pro"/>
-                    <a:ea typeface="Maven Pro"/>
-                    <a:cs typeface="Maven Pro"/>
-                    <a:sym typeface="Maven Pro"/>
-                  </a:rPr>
-                  <a:t>apporter à l’application durant le semestre 6</a:t>
-                </a:r>
-                <a:endParaRPr sz="1300" dirty="0">
-                  <a:solidFill>
-                    <a:schemeClr val="dk1"/>
-                  </a:solidFill>
-                  <a:latin typeface="Maven Pro"/>
-                  <a:ea typeface="Maven Pro"/>
-                  <a:cs typeface="Maven Pro"/>
-                  <a:sym typeface="Maven Pro"/>
-                </a:endParaRPr>
-              </a:p>
-            </p:txBody>
-          </p:sp>
-        </p:grpSp>
-        <p:sp>
-          <p:nvSpPr>
-            <p:cNvPr id="506" name="Google Shape;506;p23"/>
-            <p:cNvSpPr txBox="1"/>
-            <p:nvPr/>
-          </p:nvSpPr>
-          <p:spPr>
-            <a:xfrm>
-              <a:off x="6456774" y="1458000"/>
-              <a:ext cx="768600" cy="457200"/>
-            </a:xfrm>
-            <a:prstGeom prst="rect">
-              <a:avLst/>
-            </a:prstGeom>
-            <a:noFill/>
-            <a:ln>
-              <a:noFill/>
-            </a:ln>
-          </p:spPr>
-          <p:txBody>
-            <a:bodyPr spcFirstLastPara="1" wrap="square" lIns="91425" tIns="91425" rIns="91425" bIns="91425" anchor="ctr" anchorCtr="0">
-              <a:noAutofit/>
-            </a:bodyPr>
-            <a:lstStyle/>
-            <a:p>
-              <a:pPr marL="0" lvl="0" indent="0" algn="ctr" rtl="0">
-                <a:spcBef>
-                  <a:spcPts val="0"/>
-                </a:spcBef>
-                <a:spcAft>
-                  <a:spcPts val="0"/>
-                </a:spcAft>
-                <a:buNone/>
-              </a:pPr>
-              <a:r>
-                <a:rPr lang="en" sz="2400" dirty="0">
-                  <a:solidFill>
-                    <a:schemeClr val="accent1"/>
-                  </a:solidFill>
-                  <a:latin typeface="Share Tech"/>
-                  <a:ea typeface="Share Tech"/>
-                  <a:cs typeface="Share Tech"/>
-                  <a:sym typeface="Share Tech"/>
-                </a:rPr>
-                <a:t>02</a:t>
-              </a:r>
-              <a:endParaRPr sz="2400" dirty="0">
-                <a:solidFill>
-                  <a:schemeClr val="accent1"/>
-                </a:solidFill>
-                <a:latin typeface="Share Tech"/>
-                <a:ea typeface="Share Tech"/>
-                <a:cs typeface="Share Tech"/>
-                <a:sym typeface="Share Tech"/>
-              </a:endParaRPr>
-            </a:p>
-          </p:txBody>
-        </p:sp>
-      </p:grpSp>
-      <p:cxnSp>
-        <p:nvCxnSpPr>
-          <p:cNvPr id="508" name="Google Shape;508;p23"/>
-          <p:cNvCxnSpPr>
-            <a:cxnSpLocks/>
-            <a:stCxn id="501" idx="3"/>
-            <a:endCxn id="506" idx="1"/>
-          </p:cNvCxnSpPr>
-          <p:nvPr/>
-        </p:nvCxnSpPr>
-        <p:spPr>
-          <a:xfrm>
-            <a:off x="2301298" y="1681900"/>
-            <a:ext cx="1146900" cy="0"/>
-          </a:xfrm>
-          <a:prstGeom prst="straightConnector1">
-            <a:avLst/>
-          </a:prstGeom>
-          <a:noFill/>
-          <a:ln w="19050" cap="flat" cmpd="sng">
-            <a:solidFill>
-              <a:schemeClr val="lt2"/>
-            </a:solidFill>
-            <a:prstDash val="dash"/>
-            <a:round/>
-            <a:headEnd type="none" w="med" len="med"/>
-            <a:tailEnd type="none" w="med" len="med"/>
-          </a:ln>
-        </p:spPr>
-      </p:cxnSp>
-      <p:cxnSp>
-        <p:nvCxnSpPr>
-          <p:cNvPr id="510" name="Google Shape;510;p23"/>
-          <p:cNvCxnSpPr>
-            <a:cxnSpLocks/>
-            <a:stCxn id="501" idx="2"/>
-            <a:endCxn id="470" idx="0"/>
-          </p:cNvCxnSpPr>
-          <p:nvPr/>
-        </p:nvCxnSpPr>
-        <p:spPr>
-          <a:xfrm flipH="1">
-            <a:off x="1914624" y="1910500"/>
-            <a:ext cx="2374" cy="271659"/>
-          </a:xfrm>
-          <a:prstGeom prst="straightConnector1">
-            <a:avLst/>
-          </a:prstGeom>
-          <a:noFill/>
-          <a:ln w="19050" cap="flat" cmpd="sng">
-            <a:solidFill>
-              <a:schemeClr val="lt2"/>
-            </a:solidFill>
-            <a:prstDash val="solid"/>
-            <a:round/>
-            <a:headEnd type="none" w="med" len="med"/>
-            <a:tailEnd type="oval" w="med" len="med"/>
-          </a:ln>
-        </p:spPr>
-      </p:cxnSp>
-      <p:cxnSp>
-        <p:nvCxnSpPr>
-          <p:cNvPr id="511" name="Google Shape;511;p23"/>
-          <p:cNvCxnSpPr>
-            <a:cxnSpLocks/>
-            <a:stCxn id="506" idx="2"/>
-            <a:endCxn id="472" idx="0"/>
-          </p:cNvCxnSpPr>
-          <p:nvPr/>
-        </p:nvCxnSpPr>
-        <p:spPr>
-          <a:xfrm flipH="1">
-            <a:off x="3831773" y="1910500"/>
-            <a:ext cx="725" cy="236750"/>
-          </a:xfrm>
-          <a:prstGeom prst="straightConnector1">
-            <a:avLst/>
-          </a:prstGeom>
-          <a:noFill/>
-          <a:ln w="19050" cap="flat" cmpd="sng">
-            <a:solidFill>
-              <a:schemeClr val="lt2"/>
-            </a:solidFill>
-            <a:prstDash val="solid"/>
-            <a:round/>
-            <a:headEnd type="none" w="med" len="med"/>
-            <a:tailEnd type="oval" w="med" len="med"/>
-          </a:ln>
-        </p:spPr>
-      </p:cxnSp>
-      <p:sp>
-        <p:nvSpPr>
-          <p:cNvPr id="2" name="ZoneTexte 1">
-            <a:extLst>
-              <a:ext uri="{FF2B5EF4-FFF2-40B4-BE49-F238E27FC236}">
-                <a16:creationId xmlns:a16="http://schemas.microsoft.com/office/drawing/2014/main" id="{A8EA55CD-2847-E81C-7BED-E27AF3C38BD7}"/>
-              </a:ext>
-            </a:extLst>
-          </p:cNvPr>
-          <p:cNvSpPr txBox="1"/>
-          <p:nvPr/>
-        </p:nvSpPr>
-        <p:spPr>
-          <a:xfrm>
-            <a:off x="8781856" y="4806393"/>
-            <a:ext cx="362144" cy="261610"/>
-          </a:xfrm>
-          <a:prstGeom prst="rect">
-            <a:avLst/>
-          </a:prstGeom>
-          <a:noFill/>
-        </p:spPr>
-        <p:txBody>
-          <a:bodyPr wrap="square" rtlCol="0">
-            <a:spAutoFit/>
-          </a:bodyPr>
-          <a:lstStyle/>
-          <a:p>
-            <a:r>
-              <a:rPr lang="fr-FR" sz="1100" dirty="0">
-                <a:solidFill>
-                  <a:schemeClr val="tx1"/>
-                </a:solidFill>
-                <a:latin typeface="Maven Pro" panose="020B0604020202020204" charset="0"/>
-              </a:rPr>
-              <a:t>18</a:t>
-            </a:r>
-          </a:p>
-        </p:txBody>
-      </p:sp>
-      <p:pic>
-        <p:nvPicPr>
-          <p:cNvPr id="17" name="Graphique 16" descr="Carte topographique contour">
-            <a:extLst>
-              <a:ext uri="{FF2B5EF4-FFF2-40B4-BE49-F238E27FC236}">
-                <a16:creationId xmlns:a16="http://schemas.microsoft.com/office/drawing/2014/main" id="{3908EBA0-2CBD-FA32-A930-76DD5E6BBBAF}"/>
-              </a:ext>
-            </a:extLst>
-          </p:cNvPr>
-          <p:cNvPicPr>
-            <a:picLocks noChangeAspect="1"/>
-          </p:cNvPicPr>
-          <p:nvPr/>
-        </p:nvPicPr>
-        <p:blipFill>
-          <a:blip r:embed="rId3">
-            <a:extLst>
-              <a:ext uri="{96DAC541-7B7A-43D3-8B79-37D633B846F1}">
-                <asvg:svgBlip xmlns:asvg="http://schemas.microsoft.com/office/drawing/2016/SVG/main" r:embed="rId4"/>
-              </a:ext>
-            </a:extLst>
-          </a:blip>
-          <a:stretch>
-            <a:fillRect/>
-          </a:stretch>
-        </p:blipFill>
-        <p:spPr>
-          <a:xfrm>
-            <a:off x="1582804" y="2239237"/>
-            <a:ext cx="663640" cy="663640"/>
-          </a:xfrm>
-          <a:prstGeom prst="rect">
-            <a:avLst/>
-          </a:prstGeom>
-        </p:spPr>
-      </p:pic>
-      <p:pic>
-        <p:nvPicPr>
-          <p:cNvPr id="22" name="Graphique 21" descr="Plan contour">
-            <a:extLst>
-              <a:ext uri="{FF2B5EF4-FFF2-40B4-BE49-F238E27FC236}">
-                <a16:creationId xmlns:a16="http://schemas.microsoft.com/office/drawing/2014/main" id="{442C319D-5CA1-DDE6-CABA-6B42ECE25E52}"/>
-              </a:ext>
-            </a:extLst>
-          </p:cNvPr>
-          <p:cNvPicPr>
-            <a:picLocks noChangeAspect="1"/>
-          </p:cNvPicPr>
-          <p:nvPr/>
-        </p:nvPicPr>
-        <p:blipFill>
-          <a:blip r:embed="rId5">
-            <a:extLst>
-              <a:ext uri="{96DAC541-7B7A-43D3-8B79-37D633B846F1}">
-                <asvg:svgBlip xmlns:asvg="http://schemas.microsoft.com/office/drawing/2016/SVG/main" r:embed="rId6"/>
-              </a:ext>
-            </a:extLst>
-          </a:blip>
-          <a:stretch>
-            <a:fillRect/>
-          </a:stretch>
-        </p:blipFill>
-        <p:spPr>
-          <a:xfrm>
-            <a:off x="3448198" y="2199254"/>
-            <a:ext cx="742201" cy="742201"/>
-          </a:xfrm>
-          <a:prstGeom prst="rect">
-            <a:avLst/>
-          </a:prstGeom>
-        </p:spPr>
-      </p:pic>
-      <p:cxnSp>
-        <p:nvCxnSpPr>
-          <p:cNvPr id="34" name="Google Shape;508;p23">
-            <a:extLst>
-              <a:ext uri="{FF2B5EF4-FFF2-40B4-BE49-F238E27FC236}">
-                <a16:creationId xmlns:a16="http://schemas.microsoft.com/office/drawing/2014/main" id="{643EB9E5-5338-78AA-8B7C-28A676EE496D}"/>
-              </a:ext>
-            </a:extLst>
-          </p:cNvPr>
-          <p:cNvCxnSpPr>
-            <a:cxnSpLocks/>
-          </p:cNvCxnSpPr>
-          <p:nvPr/>
-        </p:nvCxnSpPr>
-        <p:spPr>
-          <a:xfrm>
-            <a:off x="4248323" y="1681900"/>
-            <a:ext cx="1146900" cy="0"/>
-          </a:xfrm>
-          <a:prstGeom prst="straightConnector1">
-            <a:avLst/>
-          </a:prstGeom>
-          <a:noFill/>
-          <a:ln w="19050" cap="flat" cmpd="sng">
-            <a:solidFill>
-              <a:schemeClr val="lt2"/>
-            </a:solidFill>
-            <a:prstDash val="dash"/>
-            <a:round/>
-            <a:headEnd type="none" w="med" len="med"/>
-            <a:tailEnd type="none" w="med" len="med"/>
-          </a:ln>
-        </p:spPr>
-      </p:cxnSp>
-      <p:sp>
-        <p:nvSpPr>
-          <p:cNvPr id="35" name="Google Shape;467;p23">
-            <a:extLst>
-              <a:ext uri="{FF2B5EF4-FFF2-40B4-BE49-F238E27FC236}">
-                <a16:creationId xmlns:a16="http://schemas.microsoft.com/office/drawing/2014/main" id="{D9AA9F85-76FA-E234-9959-EA8727233E3A}"/>
-              </a:ext>
-            </a:extLst>
-          </p:cNvPr>
-          <p:cNvSpPr/>
-          <p:nvPr/>
-        </p:nvSpPr>
-        <p:spPr>
-          <a:xfrm>
-            <a:off x="5013891" y="2803400"/>
-            <a:ext cx="1466700" cy="1800600"/>
-          </a:xfrm>
-          <a:prstGeom prst="rect">
-            <a:avLst/>
-          </a:prstGeom>
-          <a:noFill/>
-          <a:ln w="19050" cap="flat" cmpd="sng">
-            <a:solidFill>
-              <a:schemeClr val="lt2"/>
-            </a:solidFill>
-            <a:prstDash val="solid"/>
-            <a:round/>
-            <a:headEnd type="none" w="sm" len="sm"/>
-            <a:tailEnd type="none" w="sm" len="sm"/>
-          </a:ln>
-        </p:spPr>
-        <p:txBody>
-          <a:bodyPr spcFirstLastPara="1" wrap="square" lIns="91425" tIns="91425" rIns="91425" bIns="91425" anchor="ctr" anchorCtr="0">
-            <a:noAutofit/>
-          </a:bodyPr>
-          <a:lstStyle/>
-          <a:p>
-            <a:pPr marL="0" lvl="0" indent="0" algn="l" rtl="0">
-              <a:spcBef>
-                <a:spcPts val="0"/>
-              </a:spcBef>
-              <a:spcAft>
-                <a:spcPts val="0"/>
-              </a:spcAft>
-              <a:buNone/>
-            </a:pPr>
-            <a:endParaRPr/>
-          </a:p>
-        </p:txBody>
-      </p:sp>
-      <p:sp>
-        <p:nvSpPr>
-          <p:cNvPr id="36" name="Google Shape;468;p23">
-            <a:extLst>
-              <a:ext uri="{FF2B5EF4-FFF2-40B4-BE49-F238E27FC236}">
-                <a16:creationId xmlns:a16="http://schemas.microsoft.com/office/drawing/2014/main" id="{9462B72C-BBBF-F21A-8AB4-27D9D2F2264B}"/>
-              </a:ext>
-            </a:extLst>
-          </p:cNvPr>
-          <p:cNvSpPr/>
-          <p:nvPr/>
-        </p:nvSpPr>
-        <p:spPr>
-          <a:xfrm>
-            <a:off x="5330691" y="2147250"/>
-            <a:ext cx="833100" cy="833100"/>
-          </a:xfrm>
-          <a:prstGeom prst="rect">
-            <a:avLst/>
-          </a:prstGeom>
-          <a:solidFill>
-            <a:srgbClr val="00B050"/>
-          </a:solidFill>
-          <a:ln>
-            <a:noFill/>
-          </a:ln>
-        </p:spPr>
-        <p:txBody>
-          <a:bodyPr spcFirstLastPara="1" wrap="square" lIns="91425" tIns="91425" rIns="91425" bIns="91425" anchor="ctr" anchorCtr="0">
-            <a:noAutofit/>
-          </a:bodyPr>
-          <a:lstStyle/>
-          <a:p>
-            <a:pPr marL="0" lvl="0" indent="0" algn="l" rtl="0">
-              <a:spcBef>
-                <a:spcPts val="0"/>
-              </a:spcBef>
-              <a:spcAft>
-                <a:spcPts val="0"/>
-              </a:spcAft>
-              <a:buNone/>
-            </a:pPr>
-            <a:endParaRPr/>
-          </a:p>
-        </p:txBody>
-      </p:sp>
-      <p:grpSp>
-        <p:nvGrpSpPr>
-          <p:cNvPr id="37" name="Google Shape;492;p23">
-            <a:extLst>
-              <a:ext uri="{FF2B5EF4-FFF2-40B4-BE49-F238E27FC236}">
-                <a16:creationId xmlns:a16="http://schemas.microsoft.com/office/drawing/2014/main" id="{8514ACD5-D14E-2F2B-43C1-EEC95CE934EE}"/>
-              </a:ext>
-            </a:extLst>
-          </p:cNvPr>
-          <p:cNvGrpSpPr/>
-          <p:nvPr/>
-        </p:nvGrpSpPr>
-        <p:grpSpPr>
-          <a:xfrm>
-            <a:off x="5013861" y="1453300"/>
-            <a:ext cx="1466760" cy="2696497"/>
-            <a:chOff x="1569551" y="1458000"/>
-            <a:chExt cx="1466760" cy="2696497"/>
-          </a:xfrm>
-        </p:grpSpPr>
-        <p:grpSp>
-          <p:nvGrpSpPr>
-            <p:cNvPr id="38" name="Google Shape;493;p23">
-              <a:extLst>
-                <a:ext uri="{FF2B5EF4-FFF2-40B4-BE49-F238E27FC236}">
-                  <a16:creationId xmlns:a16="http://schemas.microsoft.com/office/drawing/2014/main" id="{6F62C98A-ABB9-CB4A-BD0B-DB0A8C78A1C7}"/>
-                </a:ext>
-              </a:extLst>
-            </p:cNvPr>
-            <p:cNvGrpSpPr/>
-            <p:nvPr/>
-          </p:nvGrpSpPr>
-          <p:grpSpPr>
-            <a:xfrm>
-              <a:off x="1569551" y="3166425"/>
-              <a:ext cx="1466760" cy="988072"/>
-              <a:chOff x="1228602" y="3299388"/>
-              <a:chExt cx="1596908" cy="988072"/>
-            </a:xfrm>
-          </p:grpSpPr>
-          <p:sp>
-            <p:nvSpPr>
-              <p:cNvPr id="40" name="Google Shape;494;p23">
-                <a:extLst>
-                  <a:ext uri="{FF2B5EF4-FFF2-40B4-BE49-F238E27FC236}">
-                    <a16:creationId xmlns:a16="http://schemas.microsoft.com/office/drawing/2014/main" id="{01E539C4-08C0-20CA-A338-270560150CEB}"/>
-                  </a:ext>
-                </a:extLst>
-              </p:cNvPr>
-              <p:cNvSpPr txBox="1"/>
-              <p:nvPr/>
-            </p:nvSpPr>
-            <p:spPr>
-              <a:xfrm>
-                <a:off x="1228610" y="3299388"/>
-                <a:ext cx="1596900" cy="457200"/>
-              </a:xfrm>
-              <a:prstGeom prst="rect">
-                <a:avLst/>
-              </a:prstGeom>
-              <a:noFill/>
-              <a:ln>
-                <a:noFill/>
-              </a:ln>
-            </p:spPr>
-            <p:txBody>
-              <a:bodyPr spcFirstLastPara="1" wrap="square" lIns="91425" tIns="91425" rIns="91425" bIns="91425" anchor="b" anchorCtr="0">
-                <a:noAutofit/>
-              </a:bodyPr>
-              <a:lstStyle/>
-              <a:p>
-                <a:pPr marL="0" lvl="0" indent="0" algn="ctr" rtl="0">
-                  <a:spcBef>
-                    <a:spcPts val="0"/>
-                  </a:spcBef>
-                  <a:spcAft>
-                    <a:spcPts val="0"/>
-                  </a:spcAft>
-                  <a:buNone/>
-                </a:pPr>
-                <a:r>
-                  <a:rPr lang="fr-FR" sz="2000" dirty="0">
-                    <a:solidFill>
-                      <a:srgbClr val="00B050"/>
-                    </a:solidFill>
-                    <a:latin typeface="Share Tech"/>
-                    <a:ea typeface="Share Tech"/>
-                    <a:cs typeface="Share Tech"/>
-                    <a:sym typeface="Share Tech"/>
-                  </a:rPr>
-                  <a:t>Test</a:t>
-                </a:r>
-                <a:endParaRPr sz="2000" dirty="0">
-                  <a:solidFill>
-                    <a:srgbClr val="00B050"/>
-                  </a:solidFill>
-                  <a:latin typeface="Share Tech"/>
-                  <a:ea typeface="Share Tech"/>
-                  <a:cs typeface="Share Tech"/>
-                  <a:sym typeface="Share Tech"/>
-                </a:endParaRPr>
-              </a:p>
-            </p:txBody>
-          </p:sp>
-          <p:sp>
-            <p:nvSpPr>
-              <p:cNvPr id="41" name="Google Shape;495;p23">
-                <a:extLst>
-                  <a:ext uri="{FF2B5EF4-FFF2-40B4-BE49-F238E27FC236}">
-                    <a16:creationId xmlns:a16="http://schemas.microsoft.com/office/drawing/2014/main" id="{01425C41-5AD6-8936-F970-AD2007C69A2E}"/>
-                  </a:ext>
-                </a:extLst>
-              </p:cNvPr>
-              <p:cNvSpPr txBox="1"/>
-              <p:nvPr/>
-            </p:nvSpPr>
-            <p:spPr>
-              <a:xfrm>
-                <a:off x="1228602" y="3606460"/>
-                <a:ext cx="1596900" cy="681000"/>
-              </a:xfrm>
-              <a:prstGeom prst="rect">
-                <a:avLst/>
-              </a:prstGeom>
-              <a:noFill/>
-              <a:ln>
-                <a:noFill/>
-              </a:ln>
-            </p:spPr>
-            <p:txBody>
-              <a:bodyPr spcFirstLastPara="1" wrap="square" lIns="91425" tIns="91425" rIns="91425" bIns="91425" anchor="t" anchorCtr="0">
-                <a:noAutofit/>
-              </a:bodyPr>
-              <a:lstStyle/>
-              <a:p>
-                <a:pPr marL="0" lvl="0" indent="0" algn="ctr" rtl="0">
-                  <a:spcBef>
-                    <a:spcPts val="0"/>
-                  </a:spcBef>
-                  <a:spcAft>
-                    <a:spcPts val="0"/>
-                  </a:spcAft>
-                  <a:buNone/>
-                </a:pPr>
-                <a:r>
-                  <a:rPr lang="fr-FR" sz="1300" dirty="0">
-                    <a:solidFill>
-                      <a:schemeClr val="dk1"/>
-                    </a:solidFill>
-                    <a:latin typeface="Maven Pro"/>
-                    <a:ea typeface="Maven Pro"/>
-                    <a:cs typeface="Maven Pro"/>
-                    <a:sym typeface="Maven Pro"/>
-                  </a:rPr>
-                  <a:t>des différentes parties de l’application</a:t>
-                </a:r>
-              </a:p>
-            </p:txBody>
-          </p:sp>
-        </p:grpSp>
-        <p:sp>
-          <p:nvSpPr>
-            <p:cNvPr id="39" name="Google Shape;496;p23">
-              <a:extLst>
-                <a:ext uri="{FF2B5EF4-FFF2-40B4-BE49-F238E27FC236}">
-                  <a16:creationId xmlns:a16="http://schemas.microsoft.com/office/drawing/2014/main" id="{43BAC7E7-EED4-83D1-4592-633EA7898170}"/>
-                </a:ext>
-              </a:extLst>
-            </p:cNvPr>
-            <p:cNvSpPr txBox="1"/>
-            <p:nvPr/>
-          </p:nvSpPr>
-          <p:spPr>
-            <a:xfrm>
-              <a:off x="1918625" y="1458000"/>
-              <a:ext cx="768600" cy="457200"/>
-            </a:xfrm>
-            <a:prstGeom prst="rect">
-              <a:avLst/>
-            </a:prstGeom>
-            <a:noFill/>
-            <a:ln>
-              <a:noFill/>
-            </a:ln>
-          </p:spPr>
-          <p:txBody>
-            <a:bodyPr spcFirstLastPara="1" wrap="square" lIns="91425" tIns="91425" rIns="91425" bIns="91425" anchor="ctr" anchorCtr="0">
-              <a:noAutofit/>
-            </a:bodyPr>
-            <a:lstStyle/>
-            <a:p>
-              <a:pPr marL="0" lvl="0" indent="0" algn="ctr" rtl="0">
-                <a:spcBef>
-                  <a:spcPts val="0"/>
-                </a:spcBef>
-                <a:spcAft>
-                  <a:spcPts val="0"/>
-                </a:spcAft>
-                <a:buNone/>
-              </a:pPr>
-              <a:r>
-                <a:rPr lang="en" sz="2400" dirty="0">
-                  <a:solidFill>
-                    <a:srgbClr val="00B050"/>
-                  </a:solidFill>
-                  <a:latin typeface="Share Tech"/>
-                  <a:ea typeface="Share Tech"/>
-                  <a:cs typeface="Share Tech"/>
-                  <a:sym typeface="Share Tech"/>
-                </a:rPr>
-                <a:t>03</a:t>
-              </a:r>
-              <a:endParaRPr sz="2400" dirty="0">
-                <a:solidFill>
-                  <a:srgbClr val="00B050"/>
-                </a:solidFill>
-                <a:latin typeface="Share Tech"/>
-                <a:ea typeface="Share Tech"/>
-                <a:cs typeface="Share Tech"/>
-                <a:sym typeface="Share Tech"/>
-              </a:endParaRPr>
-            </a:p>
-          </p:txBody>
-        </p:sp>
-      </p:grpSp>
-      <p:cxnSp>
-        <p:nvCxnSpPr>
-          <p:cNvPr id="42" name="Google Shape;509;p23">
-            <a:extLst>
-              <a:ext uri="{FF2B5EF4-FFF2-40B4-BE49-F238E27FC236}">
-                <a16:creationId xmlns:a16="http://schemas.microsoft.com/office/drawing/2014/main" id="{6865BA76-60EC-C0BB-B413-0B40BC1EED3A}"/>
-              </a:ext>
-            </a:extLst>
-          </p:cNvPr>
-          <p:cNvCxnSpPr>
-            <a:cxnSpLocks/>
-            <a:stCxn id="39" idx="2"/>
-            <a:endCxn id="36" idx="0"/>
-          </p:cNvCxnSpPr>
-          <p:nvPr/>
-        </p:nvCxnSpPr>
-        <p:spPr>
-          <a:xfrm>
-            <a:off x="5747235" y="1910500"/>
-            <a:ext cx="0" cy="236700"/>
-          </a:xfrm>
-          <a:prstGeom prst="straightConnector1">
-            <a:avLst/>
-          </a:prstGeom>
-          <a:noFill/>
-          <a:ln w="19050" cap="flat" cmpd="sng">
-            <a:solidFill>
-              <a:schemeClr val="lt2"/>
-            </a:solidFill>
-            <a:prstDash val="solid"/>
-            <a:round/>
-            <a:headEnd type="none" w="med" len="med"/>
-            <a:tailEnd type="oval" w="med" len="med"/>
-          </a:ln>
-        </p:spPr>
-      </p:cxnSp>
-      <p:cxnSp>
-        <p:nvCxnSpPr>
-          <p:cNvPr id="44" name="Google Shape;508;p23">
-            <a:extLst>
-              <a:ext uri="{FF2B5EF4-FFF2-40B4-BE49-F238E27FC236}">
-                <a16:creationId xmlns:a16="http://schemas.microsoft.com/office/drawing/2014/main" id="{B63FF989-B6C4-94AB-675B-55B99C6EC90C}"/>
-              </a:ext>
-            </a:extLst>
-          </p:cNvPr>
-          <p:cNvCxnSpPr>
-            <a:cxnSpLocks/>
-          </p:cNvCxnSpPr>
-          <p:nvPr/>
-        </p:nvCxnSpPr>
-        <p:spPr>
-          <a:xfrm>
-            <a:off x="6140157" y="1681900"/>
-            <a:ext cx="1146900" cy="0"/>
-          </a:xfrm>
-          <a:prstGeom prst="straightConnector1">
-            <a:avLst/>
-          </a:prstGeom>
-          <a:noFill/>
-          <a:ln w="19050" cap="flat" cmpd="sng">
-            <a:solidFill>
-              <a:schemeClr val="lt2"/>
-            </a:solidFill>
-            <a:prstDash val="dash"/>
-            <a:round/>
-            <a:headEnd type="none" w="med" len="med"/>
-            <a:tailEnd type="none" w="med" len="med"/>
-          </a:ln>
-        </p:spPr>
-      </p:cxnSp>
-      <p:sp>
-        <p:nvSpPr>
-          <p:cNvPr id="51" name="Google Shape;467;p23"/>
-          <p:cNvSpPr/>
-          <p:nvPr/>
-        </p:nvSpPr>
-        <p:spPr>
-          <a:xfrm>
-            <a:off x="6928622" y="2800954"/>
-            <a:ext cx="1466700" cy="1800600"/>
-          </a:xfrm>
-          <a:prstGeom prst="rect">
-            <a:avLst/>
-          </a:prstGeom>
-          <a:noFill/>
-          <a:ln w="19050" cap="flat" cmpd="sng">
-            <a:solidFill>
-              <a:schemeClr val="lt2"/>
-            </a:solidFill>
-            <a:prstDash val="solid"/>
-            <a:round/>
-            <a:headEnd type="none" w="sm" len="sm"/>
-            <a:tailEnd type="none" w="sm" len="sm"/>
-          </a:ln>
-        </p:spPr>
-        <p:txBody>
-          <a:bodyPr spcFirstLastPara="1" wrap="square" lIns="91425" tIns="91425" rIns="91425" bIns="91425" anchor="ctr" anchorCtr="0">
-            <a:noAutofit/>
-          </a:bodyPr>
-          <a:lstStyle/>
-          <a:p>
-            <a:pPr marL="0" lvl="0" indent="0" algn="l" rtl="0">
-              <a:spcBef>
-                <a:spcPts val="0"/>
-              </a:spcBef>
-              <a:spcAft>
-                <a:spcPts val="0"/>
-              </a:spcAft>
-              <a:buNone/>
-            </a:pPr>
-            <a:endParaRPr/>
-          </a:p>
-        </p:txBody>
-      </p:sp>
-      <p:grpSp>
-        <p:nvGrpSpPr>
-          <p:cNvPr id="52" name="Google Shape;492;p23"/>
-          <p:cNvGrpSpPr/>
-          <p:nvPr/>
-        </p:nvGrpSpPr>
-        <p:grpSpPr>
-          <a:xfrm>
-            <a:off x="6928591" y="1450854"/>
-            <a:ext cx="1466760" cy="2691855"/>
-            <a:chOff x="1569550" y="1458000"/>
-            <a:chExt cx="1466760" cy="2691855"/>
-          </a:xfrm>
-        </p:grpSpPr>
-        <p:grpSp>
-          <p:nvGrpSpPr>
-            <p:cNvPr id="53" name="Google Shape;493;p23"/>
-            <p:cNvGrpSpPr/>
-            <p:nvPr/>
-          </p:nvGrpSpPr>
-          <p:grpSpPr>
-            <a:xfrm>
-              <a:off x="1569550" y="3166425"/>
-              <a:ext cx="1466760" cy="983430"/>
-              <a:chOff x="1228601" y="3299388"/>
-              <a:chExt cx="1596908" cy="983430"/>
-            </a:xfrm>
-          </p:grpSpPr>
-          <p:sp>
-            <p:nvSpPr>
-              <p:cNvPr id="55" name="Google Shape;494;p23"/>
-              <p:cNvSpPr txBox="1"/>
-              <p:nvPr/>
-            </p:nvSpPr>
-            <p:spPr>
-              <a:xfrm>
-                <a:off x="1228610" y="3299388"/>
-                <a:ext cx="1596899" cy="457200"/>
-              </a:xfrm>
-              <a:prstGeom prst="rect">
-                <a:avLst/>
-              </a:prstGeom>
-              <a:noFill/>
-              <a:ln>
-                <a:noFill/>
-              </a:ln>
-            </p:spPr>
-            <p:txBody>
-              <a:bodyPr spcFirstLastPara="1" wrap="square" lIns="91425" tIns="91425" rIns="91425" bIns="91425" anchor="b" anchorCtr="0">
-                <a:noAutofit/>
-              </a:bodyPr>
-              <a:lstStyle/>
-              <a:p>
-                <a:pPr marL="0" lvl="0" indent="0" algn="ctr" rtl="0">
-                  <a:spcBef>
-                    <a:spcPts val="0"/>
-                  </a:spcBef>
-                  <a:spcAft>
-                    <a:spcPts val="0"/>
-                  </a:spcAft>
-                  <a:buNone/>
-                </a:pPr>
-                <a:r>
-                  <a:rPr lang="fr-FR" sz="2000" dirty="0">
-                    <a:solidFill>
-                      <a:schemeClr val="bg1">
-                        <a:lumMod val="50000"/>
-                        <a:lumOff val="50000"/>
-                      </a:schemeClr>
-                    </a:solidFill>
-                    <a:latin typeface="Share Tech"/>
-                    <a:ea typeface="Share Tech"/>
-                    <a:cs typeface="Share Tech"/>
-                    <a:sym typeface="Share Tech"/>
-                  </a:rPr>
-                  <a:t>CI/CD</a:t>
-                </a:r>
-                <a:endParaRPr sz="2000" dirty="0">
-                  <a:solidFill>
-                    <a:schemeClr val="bg1">
-                      <a:lumMod val="50000"/>
-                      <a:lumOff val="50000"/>
-                    </a:schemeClr>
-                  </a:solidFill>
-                  <a:latin typeface="Share Tech"/>
-                  <a:ea typeface="Share Tech"/>
-                  <a:cs typeface="Share Tech"/>
-                  <a:sym typeface="Share Tech"/>
-                </a:endParaRPr>
-              </a:p>
-            </p:txBody>
-          </p:sp>
-          <p:sp>
-            <p:nvSpPr>
-              <p:cNvPr id="56" name="Google Shape;495;p23"/>
-              <p:cNvSpPr txBox="1"/>
-              <p:nvPr/>
-            </p:nvSpPr>
-            <p:spPr>
-              <a:xfrm>
-                <a:off x="1228601" y="3601818"/>
-                <a:ext cx="1596900" cy="681000"/>
-              </a:xfrm>
-              <a:prstGeom prst="rect">
-                <a:avLst/>
-              </a:prstGeom>
-              <a:noFill/>
-              <a:ln>
-                <a:noFill/>
-              </a:ln>
-            </p:spPr>
-            <p:txBody>
-              <a:bodyPr spcFirstLastPara="1" wrap="square" lIns="91425" tIns="91425" rIns="91425" bIns="91425" anchor="t" anchorCtr="0">
-                <a:noAutofit/>
-              </a:bodyPr>
-              <a:lstStyle/>
-              <a:p>
-                <a:pPr marL="0" lvl="0" indent="0" algn="ctr" rtl="0">
-                  <a:spcBef>
-                    <a:spcPts val="0"/>
-                  </a:spcBef>
-                  <a:spcAft>
-                    <a:spcPts val="0"/>
-                  </a:spcAft>
-                  <a:buNone/>
-                </a:pPr>
-                <a:r>
-                  <a:rPr lang="fr-FR" sz="1300" dirty="0">
-                    <a:solidFill>
-                      <a:schemeClr val="dk1"/>
-                    </a:solidFill>
-                    <a:latin typeface="Maven Pro"/>
-                    <a:ea typeface="Maven Pro"/>
-                    <a:cs typeface="Maven Pro"/>
-                    <a:sym typeface="Maven Pro"/>
-                  </a:rPr>
-                  <a:t>mis en place, ainsi que son fonctionnement</a:t>
-                </a:r>
-                <a:endParaRPr sz="1300" dirty="0">
-                  <a:solidFill>
-                    <a:schemeClr val="dk1"/>
-                  </a:solidFill>
-                  <a:latin typeface="Maven Pro"/>
-                  <a:ea typeface="Maven Pro"/>
-                  <a:cs typeface="Maven Pro"/>
-                  <a:sym typeface="Maven Pro"/>
-                </a:endParaRPr>
-              </a:p>
-            </p:txBody>
-          </p:sp>
-        </p:grpSp>
-        <p:sp>
-          <p:nvSpPr>
-            <p:cNvPr id="54" name="Google Shape;496;p23"/>
-            <p:cNvSpPr txBox="1"/>
-            <p:nvPr/>
-          </p:nvSpPr>
-          <p:spPr>
-            <a:xfrm>
-              <a:off x="1918625" y="1458000"/>
-              <a:ext cx="768600" cy="457200"/>
-            </a:xfrm>
-            <a:prstGeom prst="rect">
-              <a:avLst/>
-            </a:prstGeom>
-            <a:noFill/>
-            <a:ln>
-              <a:noFill/>
-            </a:ln>
-          </p:spPr>
-          <p:txBody>
-            <a:bodyPr spcFirstLastPara="1" wrap="square" lIns="91425" tIns="91425" rIns="91425" bIns="91425" anchor="ctr" anchorCtr="0">
-              <a:noAutofit/>
-            </a:bodyPr>
-            <a:lstStyle/>
-            <a:p>
-              <a:pPr marL="0" lvl="0" indent="0" algn="ctr" rtl="0">
-                <a:spcBef>
-                  <a:spcPts val="0"/>
-                </a:spcBef>
-                <a:spcAft>
-                  <a:spcPts val="0"/>
-                </a:spcAft>
-                <a:buNone/>
-              </a:pPr>
-              <a:r>
-                <a:rPr lang="en" sz="2400" dirty="0">
-                  <a:solidFill>
-                    <a:schemeClr val="bg1">
-                      <a:lumMod val="50000"/>
-                      <a:lumOff val="50000"/>
-                    </a:schemeClr>
-                  </a:solidFill>
-                  <a:latin typeface="Share Tech"/>
-                  <a:ea typeface="Share Tech"/>
-                  <a:cs typeface="Share Tech"/>
-                  <a:sym typeface="Share Tech"/>
-                </a:rPr>
-                <a:t>04</a:t>
-              </a:r>
-              <a:endParaRPr sz="2400" dirty="0">
-                <a:solidFill>
-                  <a:schemeClr val="bg1">
-                    <a:lumMod val="50000"/>
-                    <a:lumOff val="50000"/>
-                  </a:schemeClr>
-                </a:solidFill>
-                <a:latin typeface="Share Tech"/>
-                <a:ea typeface="Share Tech"/>
-                <a:cs typeface="Share Tech"/>
-                <a:sym typeface="Share Tech"/>
-              </a:endParaRPr>
-            </a:p>
-          </p:txBody>
-        </p:sp>
-      </p:grpSp>
-      <p:cxnSp>
-        <p:nvCxnSpPr>
-          <p:cNvPr id="57" name="Google Shape;509;p23"/>
-          <p:cNvCxnSpPr>
-            <a:cxnSpLocks/>
-            <a:stCxn id="54" idx="2"/>
-          </p:cNvCxnSpPr>
-          <p:nvPr/>
-        </p:nvCxnSpPr>
-        <p:spPr>
-          <a:xfrm>
-            <a:off x="7661966" y="1908054"/>
-            <a:ext cx="0" cy="236700"/>
-          </a:xfrm>
-          <a:prstGeom prst="straightConnector1">
-            <a:avLst/>
-          </a:prstGeom>
-          <a:noFill/>
-          <a:ln w="19050" cap="flat" cmpd="sng">
-            <a:solidFill>
-              <a:schemeClr val="lt2"/>
-            </a:solidFill>
-            <a:prstDash val="solid"/>
-            <a:round/>
-            <a:headEnd type="none" w="med" len="med"/>
-            <a:tailEnd type="oval" w="med" len="med"/>
-          </a:ln>
-        </p:spPr>
-      </p:cxnSp>
-      <p:sp>
-        <p:nvSpPr>
-          <p:cNvPr id="58" name="Google Shape;468;p23"/>
-          <p:cNvSpPr/>
-          <p:nvPr/>
-        </p:nvSpPr>
-        <p:spPr>
-          <a:xfrm>
-            <a:off x="7245422" y="2144804"/>
-            <a:ext cx="833100" cy="833100"/>
-          </a:xfrm>
-          <a:prstGeom prst="rect">
-            <a:avLst/>
-          </a:prstGeom>
-          <a:solidFill>
-            <a:schemeClr val="bg1">
-              <a:lumMod val="50000"/>
-              <a:lumOff val="50000"/>
-            </a:schemeClr>
-          </a:solidFill>
-          <a:ln>
-            <a:noFill/>
-          </a:ln>
-        </p:spPr>
-        <p:txBody>
-          <a:bodyPr spcFirstLastPara="1" wrap="square" lIns="91425" tIns="91425" rIns="91425" bIns="91425" anchor="ctr" anchorCtr="0">
-            <a:noAutofit/>
-          </a:bodyPr>
-          <a:lstStyle/>
-          <a:p>
-            <a:pPr marL="0" lvl="0" indent="0" algn="l" rtl="0">
-              <a:spcBef>
-                <a:spcPts val="0"/>
-              </a:spcBef>
-              <a:spcAft>
-                <a:spcPts val="0"/>
-              </a:spcAft>
-              <a:buNone/>
-            </a:pPr>
-            <a:endParaRPr dirty="0"/>
-          </a:p>
-        </p:txBody>
-      </p:sp>
-      <p:pic>
-        <p:nvPicPr>
-          <p:cNvPr id="62" name="Graphique 61" descr="Fiole contour">
-            <a:extLst>
-              <a:ext uri="{FF2B5EF4-FFF2-40B4-BE49-F238E27FC236}">
-                <a16:creationId xmlns:a16="http://schemas.microsoft.com/office/drawing/2014/main" id="{2093F441-C465-D61A-2BC3-49DCC8EF9A07}"/>
-              </a:ext>
-            </a:extLst>
-          </p:cNvPr>
-          <p:cNvPicPr>
-            <a:picLocks noChangeAspect="1"/>
-          </p:cNvPicPr>
-          <p:nvPr/>
-        </p:nvPicPr>
-        <p:blipFill>
-          <a:blip r:embed="rId7">
-            <a:extLst>
-              <a:ext uri="{96DAC541-7B7A-43D3-8B79-37D633B846F1}">
-                <asvg:svgBlip xmlns:asvg="http://schemas.microsoft.com/office/drawing/2016/SVG/main" r:embed="rId8"/>
-              </a:ext>
-            </a:extLst>
-          </a:blip>
-          <a:stretch>
-            <a:fillRect/>
-          </a:stretch>
-        </p:blipFill>
-        <p:spPr>
-          <a:xfrm>
-            <a:off x="5374725" y="2226087"/>
-            <a:ext cx="726981" cy="726981"/>
-          </a:xfrm>
-          <a:prstGeom prst="rect">
-            <a:avLst/>
-          </a:prstGeom>
-        </p:spPr>
-      </p:pic>
-      <p:pic>
-        <p:nvPicPr>
-          <p:cNvPr id="1030" name="Picture 6" descr="GitLab logo in transparent PNG and vectorized SVG formats">
-            <a:extLst>
-              <a:ext uri="{FF2B5EF4-FFF2-40B4-BE49-F238E27FC236}">
-                <a16:creationId xmlns:a16="http://schemas.microsoft.com/office/drawing/2014/main" id="{00E91AF6-E7E2-F421-FEBA-C8D9AC5526F5}"/>
-              </a:ext>
-            </a:extLst>
-          </p:cNvPr>
-          <p:cNvPicPr>
-            <a:picLocks noChangeAspect="1" noChangeArrowheads="1"/>
-          </p:cNvPicPr>
-          <p:nvPr/>
-        </p:nvPicPr>
-        <p:blipFill>
-          <a:blip r:embed="rId9">
-            <a:extLst>
-              <a:ext uri="{28A0092B-C50C-407E-A947-70E740481C1C}">
-                <a14:useLocalDpi xmlns:a14="http://schemas.microsoft.com/office/drawing/2010/main" val="0"/>
-              </a:ext>
-            </a:extLst>
-          </a:blip>
-          <a:srcRect/>
-          <a:stretch>
-            <a:fillRect/>
-          </a:stretch>
-        </p:blipFill>
-        <p:spPr bwMode="auto">
-          <a:xfrm>
-            <a:off x="7360467" y="2320130"/>
-            <a:ext cx="570917" cy="528657"/>
-          </a:xfrm>
-          <a:prstGeom prst="rect">
-            <a:avLst/>
-          </a:prstGeom>
-          <a:noFill/>
-          <a:extLst>
-            <a:ext uri="{909E8E84-426E-40DD-AFC4-6F175D3DCCD1}">
-              <a14:hiddenFill xmlns:a14="http://schemas.microsoft.com/office/drawing/2010/main">
-                <a:solidFill>
-                  <a:srgbClr val="FFFFFF"/>
-                </a:solidFill>
-              </a14:hiddenFill>
-            </a:ext>
-          </a:extLst>
-        </p:spPr>
-      </p:pic>
-    </p:spTree>
-    <p:extLst>
-      <p:ext uri="{BB962C8B-B14F-4D97-AF65-F5344CB8AC3E}">
-        <p14:creationId xmlns:p14="http://schemas.microsoft.com/office/powerpoint/2010/main" val="1927940920"/>
       </p:ext>
     </p:extLst>
   </p:cSld>
@@ -23658,6 +23994,21 @@
 </file>
 
 <file path=customXml/item1.xml><?xml version="1.0" encoding="utf-8"?>
+<?mso-contentType ?>
+<FormTemplates xmlns="http://schemas.microsoft.com/sharepoint/v3/contenttype/forms">
+  <Display>DocumentLibraryForm</Display>
+  <Edit>DocumentLibraryForm</Edit>
+  <New>DocumentLibraryForm</New>
+</FormTemplates>
+</file>
+
+<file path=customXml/item2.xml><?xml version="1.0" encoding="utf-8"?>
+<p:properties xmlns:p="http://schemas.microsoft.com/office/2006/metadata/properties" xmlns:xsi="http://www.w3.org/2001/XMLSchema-instance" xmlns:pc="http://schemas.microsoft.com/office/infopath/2007/PartnerControls">
+  <documentManagement/>
+</p:properties>
+</file>
+
+<file path=customXml/item3.xml><?xml version="1.0" encoding="utf-8"?>
 <ct:contentTypeSchema xmlns:ct="http://schemas.microsoft.com/office/2006/metadata/contentType" xmlns:ma="http://schemas.microsoft.com/office/2006/metadata/properties/metaAttributes" ct:_="" ma:_="" ma:contentTypeName="Document" ma:contentTypeID="0x0101008CEA7F8095A03344ABB714D5F8C794CE" ma:contentTypeVersion="8" ma:contentTypeDescription="Crée un document." ma:contentTypeScope="" ma:versionID="19ad794433a5a6f8f776704d78925295">
   <xsd:schema xmlns:xsd="http://www.w3.org/2001/XMLSchema" xmlns:xs="http://www.w3.org/2001/XMLSchema" xmlns:p="http://schemas.microsoft.com/office/2006/metadata/properties" xmlns:ns3="bb86211b-6858-4a67-bee9-3cc0c565fc01" xmlns:ns4="a4505148-1984-4b71-82bf-8ee338bb755e" targetNamespace="http://schemas.microsoft.com/office/2006/metadata/properties" ma:root="true" ma:fieldsID="0f739ac12f40b9d02b74301e2a60e0ec" ns3:_="" ns4:_="">
     <xsd:import namespace="bb86211b-6858-4a67-bee9-3cc0c565fc01"/>
@@ -23848,36 +24199,10 @@
 </ct:contentTypeSchema>
 </file>
 
-<file path=customXml/item2.xml><?xml version="1.0" encoding="utf-8"?>
-<p:properties xmlns:p="http://schemas.microsoft.com/office/2006/metadata/properties" xmlns:xsi="http://www.w3.org/2001/XMLSchema-instance" xmlns:pc="http://schemas.microsoft.com/office/infopath/2007/PartnerControls">
-  <documentManagement/>
-</p:properties>
-</file>
-
-<file path=customXml/item3.xml><?xml version="1.0" encoding="utf-8"?>
-<?mso-contentType ?>
-<FormTemplates xmlns="http://schemas.microsoft.com/sharepoint/v3/contenttype/forms">
-  <Display>DocumentLibraryForm</Display>
-  <Edit>DocumentLibraryForm</Edit>
-  <New>DocumentLibraryForm</New>
-</FormTemplates>
-</file>
-
 <file path=customXml/itemProps1.xml><?xml version="1.0" encoding="utf-8"?>
-<ds:datastoreItem xmlns:ds="http://schemas.openxmlformats.org/officeDocument/2006/customXml" ds:itemID="{4046F691-00C8-47A5-8C80-2E9093E8930C}">
+<ds:datastoreItem xmlns:ds="http://schemas.openxmlformats.org/officeDocument/2006/customXml" ds:itemID="{FABF05A6-EFD4-4AFB-BAA9-65A8EB6C8E2D}">
   <ds:schemaRefs>
-    <ds:schemaRef ds:uri="a4505148-1984-4b71-82bf-8ee338bb755e"/>
-    <ds:schemaRef ds:uri="bb86211b-6858-4a67-bee9-3cc0c565fc01"/>
-    <ds:schemaRef ds:uri="http://purl.org/dc/elements/1.1/"/>
-    <ds:schemaRef ds:uri="http://purl.org/dc/terms/"/>
-    <ds:schemaRef ds:uri="http://schemas.microsoft.com/internal/obd"/>
-    <ds:schemaRef ds:uri="http://schemas.microsoft.com/office/2006/documentManagement/types"/>
-    <ds:schemaRef ds:uri="http://schemas.microsoft.com/office/2006/metadata/contentType"/>
-    <ds:schemaRef ds:uri="http://schemas.microsoft.com/office/2006/metadata/properties"/>
-    <ds:schemaRef ds:uri="http://schemas.microsoft.com/office/2006/metadata/properties/metaAttributes"/>
-    <ds:schemaRef ds:uri="http://schemas.microsoft.com/office/infopath/2007/PartnerControls"/>
-    <ds:schemaRef ds:uri="http://schemas.openxmlformats.org/package/2006/metadata/core-properties"/>
-    <ds:schemaRef ds:uri="http://www.w3.org/2001/XMLSchema"/>
+    <ds:schemaRef ds:uri="http://schemas.microsoft.com/sharepoint/v3/contenttype/forms"/>
   </ds:schemaRefs>
 </ds:datastoreItem>
 </file>
@@ -23900,9 +24225,20 @@
 </file>
 
 <file path=customXml/itemProps3.xml><?xml version="1.0" encoding="utf-8"?>
-<ds:datastoreItem xmlns:ds="http://schemas.openxmlformats.org/officeDocument/2006/customXml" ds:itemID="{FABF05A6-EFD4-4AFB-BAA9-65A8EB6C8E2D}">
+<ds:datastoreItem xmlns:ds="http://schemas.openxmlformats.org/officeDocument/2006/customXml" ds:itemID="{4046F691-00C8-47A5-8C80-2E9093E8930C}">
   <ds:schemaRefs>
-    <ds:schemaRef ds:uri="http://schemas.microsoft.com/sharepoint/v3/contenttype/forms"/>
+    <ds:schemaRef ds:uri="a4505148-1984-4b71-82bf-8ee338bb755e"/>
+    <ds:schemaRef ds:uri="bb86211b-6858-4a67-bee9-3cc0c565fc01"/>
+    <ds:schemaRef ds:uri="http://purl.org/dc/elements/1.1/"/>
+    <ds:schemaRef ds:uri="http://purl.org/dc/terms/"/>
+    <ds:schemaRef ds:uri="http://schemas.microsoft.com/internal/obd"/>
+    <ds:schemaRef ds:uri="http://schemas.microsoft.com/office/2006/documentManagement/types"/>
+    <ds:schemaRef ds:uri="http://schemas.microsoft.com/office/2006/metadata/contentType"/>
+    <ds:schemaRef ds:uri="http://schemas.microsoft.com/office/2006/metadata/properties"/>
+    <ds:schemaRef ds:uri="http://schemas.microsoft.com/office/2006/metadata/properties/metaAttributes"/>
+    <ds:schemaRef ds:uri="http://schemas.microsoft.com/office/infopath/2007/PartnerControls"/>
+    <ds:schemaRef ds:uri="http://schemas.openxmlformats.org/package/2006/metadata/core-properties"/>
+    <ds:schemaRef ds:uri="http://www.w3.org/2001/XMLSchema"/>
   </ds:schemaRefs>
 </ds:datastoreItem>
 </file>
</xml_diff>